<commit_message>
Cleaning up and adding some bettter plot info
</commit_message>
<xml_diff>
--- a/Presentations/TSD_Jan826.pptx
+++ b/Presentations/TSD_Jan826.pptx
@@ -5,16 +5,17 @@
     <p:sldMasterId id="2147483648" r:id="rId1"/>
   </p:sldMasterIdLst>
   <p:notesMasterIdLst>
-    <p:notesMasterId r:id="rId9"/>
+    <p:notesMasterId r:id="rId10"/>
   </p:notesMasterIdLst>
   <p:sldIdLst>
     <p:sldId id="256" r:id="rId2"/>
-    <p:sldId id="257" r:id="rId3"/>
-    <p:sldId id="259" r:id="rId4"/>
-    <p:sldId id="260" r:id="rId5"/>
-    <p:sldId id="261" r:id="rId6"/>
-    <p:sldId id="262" r:id="rId7"/>
-    <p:sldId id="263" r:id="rId8"/>
+    <p:sldId id="265" r:id="rId3"/>
+    <p:sldId id="257" r:id="rId4"/>
+    <p:sldId id="259" r:id="rId5"/>
+    <p:sldId id="260" r:id="rId6"/>
+    <p:sldId id="261" r:id="rId7"/>
+    <p:sldId id="262" r:id="rId8"/>
+    <p:sldId id="263" r:id="rId9"/>
   </p:sldIdLst>
   <p:sldSz cx="12192000" cy="6858000"/>
   <p:notesSz cx="6858000" cy="9144000"/>
@@ -203,7 +204,7 @@
           <a:p>
             <a:fld id="{7F4B4076-ADC4-F541-AC76-611EF9C4BEA6}" type="datetimeFigureOut">
               <a:rPr lang="en-US" smtClean="0"/>
-              <a:t>1/9/26</a:t>
+              <a:t>1/12/26</a:t>
             </a:fld>
             <a:endParaRPr lang="en-US"/>
           </a:p>
@@ -544,7 +545,7 @@
     </p:spTree>
     <p:extLst>
       <p:ext uri="{BB962C8B-B14F-4D97-AF65-F5344CB8AC3E}">
-        <p14:creationId xmlns:p14="http://schemas.microsoft.com/office/powerpoint/2010/main" val="1783357671"/>
+        <p14:creationId xmlns:p14="http://schemas.microsoft.com/office/powerpoint/2010/main" val="3812665690"/>
       </p:ext>
     </p:extLst>
   </p:cSld>
@@ -619,7 +620,175 @@
           <a:p>
             <a:fld id="{A5419B45-71E2-6143-9486-354B8DA99FEA}" type="slidenum">
               <a:rPr lang="en-US" smtClean="0"/>
-              <a:t>7</a:t>
+              <a:t>3</a:t>
+            </a:fld>
+            <a:endParaRPr lang="en-US"/>
+          </a:p>
+        </p:txBody>
+      </p:sp>
+    </p:spTree>
+    <p:extLst>
+      <p:ext uri="{BB962C8B-B14F-4D97-AF65-F5344CB8AC3E}">
+        <p14:creationId xmlns:p14="http://schemas.microsoft.com/office/powerpoint/2010/main" val="1783357671"/>
+      </p:ext>
+    </p:extLst>
+  </p:cSld>
+  <p:clrMapOvr>
+    <a:masterClrMapping/>
+  </p:clrMapOvr>
+</p:notes>
+</file>
+
+<file path=ppt/notesSlides/notesSlide3.xml><?xml version="1.0" encoding="utf-8"?>
+<p:notes xmlns:a="http://schemas.openxmlformats.org/drawingml/2006/main" xmlns:r="http://schemas.openxmlformats.org/officeDocument/2006/relationships" xmlns:p="http://schemas.openxmlformats.org/presentationml/2006/main">
+  <p:cSld>
+    <p:spTree>
+      <p:nvGrpSpPr>
+        <p:cNvPr id="1" name=""/>
+        <p:cNvGrpSpPr/>
+        <p:nvPr/>
+      </p:nvGrpSpPr>
+      <p:grpSpPr>
+        <a:xfrm>
+          <a:off x="0" y="0"/>
+          <a:ext cx="0" cy="0"/>
+          <a:chOff x="0" y="0"/>
+          <a:chExt cx="0" cy="0"/>
+        </a:xfrm>
+      </p:grpSpPr>
+      <p:sp>
+        <p:nvSpPr>
+          <p:cNvPr id="2" name="Slide Image Placeholder 1"/>
+          <p:cNvSpPr>
+            <a:spLocks noGrp="1" noRot="1" noChangeAspect="1"/>
+          </p:cNvSpPr>
+          <p:nvPr>
+            <p:ph type="sldImg"/>
+          </p:nvPr>
+        </p:nvSpPr>
+        <p:spPr/>
+      </p:sp>
+      <p:sp>
+        <p:nvSpPr>
+          <p:cNvPr id="3" name="Notes Placeholder 2"/>
+          <p:cNvSpPr>
+            <a:spLocks noGrp="1"/>
+          </p:cNvSpPr>
+          <p:nvPr>
+            <p:ph type="body" idx="1"/>
+          </p:nvPr>
+        </p:nvSpPr>
+        <p:spPr/>
+        <p:txBody>
+          <a:bodyPr/>
+          <a:lstStyle/>
+          <a:p>
+            <a:endParaRPr lang="en-US" dirty="0"/>
+          </a:p>
+        </p:txBody>
+      </p:sp>
+      <p:sp>
+        <p:nvSpPr>
+          <p:cNvPr id="4" name="Slide Number Placeholder 3"/>
+          <p:cNvSpPr>
+            <a:spLocks noGrp="1"/>
+          </p:cNvSpPr>
+          <p:nvPr>
+            <p:ph type="sldNum" sz="quarter" idx="5"/>
+          </p:nvPr>
+        </p:nvSpPr>
+        <p:spPr/>
+        <p:txBody>
+          <a:bodyPr/>
+          <a:lstStyle/>
+          <a:p>
+            <a:fld id="{A5419B45-71E2-6143-9486-354B8DA99FEA}" type="slidenum">
+              <a:rPr lang="en-US" smtClean="0"/>
+              <a:t>6</a:t>
+            </a:fld>
+            <a:endParaRPr lang="en-US"/>
+          </a:p>
+        </p:txBody>
+      </p:sp>
+    </p:spTree>
+    <p:extLst>
+      <p:ext uri="{BB962C8B-B14F-4D97-AF65-F5344CB8AC3E}">
+        <p14:creationId xmlns:p14="http://schemas.microsoft.com/office/powerpoint/2010/main" val="400664250"/>
+      </p:ext>
+    </p:extLst>
+  </p:cSld>
+  <p:clrMapOvr>
+    <a:masterClrMapping/>
+  </p:clrMapOvr>
+</p:notes>
+</file>
+
+<file path=ppt/notesSlides/notesSlide4.xml><?xml version="1.0" encoding="utf-8"?>
+<p:notes xmlns:a="http://schemas.openxmlformats.org/drawingml/2006/main" xmlns:r="http://schemas.openxmlformats.org/officeDocument/2006/relationships" xmlns:p="http://schemas.openxmlformats.org/presentationml/2006/main">
+  <p:cSld>
+    <p:spTree>
+      <p:nvGrpSpPr>
+        <p:cNvPr id="1" name=""/>
+        <p:cNvGrpSpPr/>
+        <p:nvPr/>
+      </p:nvGrpSpPr>
+      <p:grpSpPr>
+        <a:xfrm>
+          <a:off x="0" y="0"/>
+          <a:ext cx="0" cy="0"/>
+          <a:chOff x="0" y="0"/>
+          <a:chExt cx="0" cy="0"/>
+        </a:xfrm>
+      </p:grpSpPr>
+      <p:sp>
+        <p:nvSpPr>
+          <p:cNvPr id="2" name="Slide Image Placeholder 1"/>
+          <p:cNvSpPr>
+            <a:spLocks noGrp="1" noRot="1" noChangeAspect="1"/>
+          </p:cNvSpPr>
+          <p:nvPr>
+            <p:ph type="sldImg"/>
+          </p:nvPr>
+        </p:nvSpPr>
+        <p:spPr/>
+      </p:sp>
+      <p:sp>
+        <p:nvSpPr>
+          <p:cNvPr id="3" name="Notes Placeholder 2"/>
+          <p:cNvSpPr>
+            <a:spLocks noGrp="1"/>
+          </p:cNvSpPr>
+          <p:nvPr>
+            <p:ph type="body" idx="1"/>
+          </p:nvPr>
+        </p:nvSpPr>
+        <p:spPr/>
+        <p:txBody>
+          <a:bodyPr/>
+          <a:lstStyle/>
+          <a:p>
+            <a:endParaRPr lang="en-US" dirty="0"/>
+          </a:p>
+        </p:txBody>
+      </p:sp>
+      <p:sp>
+        <p:nvSpPr>
+          <p:cNvPr id="4" name="Slide Number Placeholder 3"/>
+          <p:cNvSpPr>
+            <a:spLocks noGrp="1"/>
+          </p:cNvSpPr>
+          <p:nvPr>
+            <p:ph type="sldNum" sz="quarter" idx="5"/>
+          </p:nvPr>
+        </p:nvSpPr>
+        <p:spPr/>
+        <p:txBody>
+          <a:bodyPr/>
+          <a:lstStyle/>
+          <a:p>
+            <a:fld id="{A5419B45-71E2-6143-9486-354B8DA99FEA}" type="slidenum">
+              <a:rPr lang="en-US" smtClean="0"/>
+              <a:t>8</a:t>
             </a:fld>
             <a:endParaRPr lang="en-US"/>
           </a:p>
@@ -988,7 +1157,7 @@
             <a:fld id="{5923F103-BC34-4FE4-A40E-EDDEECFDA5D0}" type="datetimeFigureOut">
               <a:rPr lang="en-US" dirty="0"/>
               <a:pPr/>
-              <a:t>1/9/26</a:t>
+              <a:t>1/12/26</a:t>
             </a:fld>
             <a:endParaRPr lang="en-US" dirty="0"/>
           </a:p>
@@ -2079,7 +2248,7 @@
           <a:p>
             <a:fld id="{923A1CC3-2375-41D4-9E03-427CAF2A4C1A}" type="datetimeFigureOut">
               <a:rPr lang="en-US" dirty="0"/>
-              <a:t>1/9/26</a:t>
+              <a:t>1/12/26</a:t>
             </a:fld>
             <a:endParaRPr lang="en-US" dirty="0"/>
           </a:p>
@@ -3055,7 +3224,7 @@
           <a:p>
             <a:fld id="{AFF16868-8199-4C2C-A5B1-63AEE139F88E}" type="datetimeFigureOut">
               <a:rPr lang="en-US" dirty="0"/>
-              <a:t>1/9/26</a:t>
+              <a:t>1/12/26</a:t>
             </a:fld>
             <a:endParaRPr lang="en-US" dirty="0"/>
           </a:p>
@@ -4185,7 +4354,7 @@
           <a:p>
             <a:fld id="{AAD9FF7F-6988-44CC-821B-644E70CD2F73}" type="datetimeFigureOut">
               <a:rPr lang="en-US" dirty="0"/>
-              <a:t>1/9/26</a:t>
+              <a:t>1/12/26</a:t>
             </a:fld>
             <a:endParaRPr lang="en-US" dirty="0"/>
           </a:p>
@@ -5214,7 +5383,7 @@
           <a:p>
             <a:fld id="{5C12C299-16B2-4475-990D-751901EACC14}" type="datetimeFigureOut">
               <a:rPr lang="en-US" dirty="0"/>
-              <a:t>1/9/26</a:t>
+              <a:t>1/12/26</a:t>
             </a:fld>
             <a:endParaRPr lang="en-US" dirty="0"/>
           </a:p>
@@ -5870,7 +6039,7 @@
           <a:p>
             <a:fld id="{9FE86839-B9D8-4651-8783-F325ECE74E65}" type="datetimeFigureOut">
               <a:rPr lang="en-US" dirty="0"/>
-              <a:t>1/9/26</a:t>
+              <a:t>1/12/26</a:t>
             </a:fld>
             <a:endParaRPr lang="en-US" dirty="0"/>
           </a:p>
@@ -6727,7 +6896,7 @@
           <a:p>
             <a:fld id="{FD484F64-32F6-45C5-931F-ADC1662401D0}" type="datetimeFigureOut">
               <a:rPr lang="en-US" dirty="0"/>
-              <a:t>1/9/26</a:t>
+              <a:t>1/12/26</a:t>
             </a:fld>
             <a:endParaRPr lang="en-US" dirty="0"/>
           </a:p>
@@ -6913,7 +7082,7 @@
           <a:p>
             <a:fld id="{53086D93-FCAC-47E0-A2EE-787E62CA814C}" type="datetimeFigureOut">
               <a:rPr lang="en-US" dirty="0"/>
-              <a:t>1/9/26</a:t>
+              <a:t>1/12/26</a:t>
             </a:fld>
             <a:endParaRPr lang="en-US" dirty="0"/>
           </a:p>
@@ -7881,7 +8050,7 @@
           <a:p>
             <a:fld id="{CDA879A6-0FD0-4734-A311-86BFCA472E6E}" type="datetimeFigureOut">
               <a:rPr lang="en-US" dirty="0"/>
-              <a:t>1/9/26</a:t>
+              <a:t>1/12/26</a:t>
             </a:fld>
             <a:endParaRPr lang="en-US" dirty="0"/>
           </a:p>
@@ -8088,7 +8257,7 @@
           <a:p>
             <a:fld id="{19C9CA7B-DFD4-44B5-8C60-D14B8CD1FB59}" type="datetimeFigureOut">
               <a:rPr lang="en-US" dirty="0"/>
-              <a:t>1/9/26</a:t>
+              <a:t>1/12/26</a:t>
             </a:fld>
             <a:endParaRPr lang="en-US" dirty="0"/>
           </a:p>
@@ -9118,7 +9287,7 @@
           <a:p>
             <a:fld id="{F34E6425-0181-43F2-84FC-787E803FD2F8}" type="datetimeFigureOut">
               <a:rPr lang="en-US" dirty="0"/>
-              <a:t>1/9/26</a:t>
+              <a:t>1/12/26</a:t>
             </a:fld>
             <a:endParaRPr lang="en-US" dirty="0"/>
           </a:p>
@@ -9386,7 +9555,7 @@
           <a:p>
             <a:fld id="{3BDB8791-F1B0-41E7-B7FD-A781E65C4266}" type="datetimeFigureOut">
               <a:rPr lang="en-US" dirty="0"/>
-              <a:t>1/9/26</a:t>
+              <a:t>1/12/26</a:t>
             </a:fld>
             <a:endParaRPr lang="en-US" dirty="0"/>
           </a:p>
@@ -9792,7 +9961,7 @@
           <a:p>
             <a:fld id="{5FDD63B2-E120-4ED8-B27B-C685F510A5FE}" type="datetimeFigureOut">
               <a:rPr lang="en-US" dirty="0"/>
-              <a:t>1/9/26</a:t>
+              <a:t>1/12/26</a:t>
             </a:fld>
             <a:endParaRPr lang="en-US" dirty="0"/>
           </a:p>
@@ -9915,7 +10084,7 @@
           <a:p>
             <a:fld id="{7AA18ACC-A947-437B-A130-35BD54FDF1E9}" type="datetimeFigureOut">
               <a:rPr lang="en-US" dirty="0"/>
-              <a:t>1/9/26</a:t>
+              <a:t>1/12/26</a:t>
             </a:fld>
             <a:endParaRPr lang="en-US" dirty="0"/>
           </a:p>
@@ -10006,7 +10175,7 @@
           <a:p>
             <a:fld id="{7C8D7E02-BCB8-4D50-A234-369438C08659}" type="datetimeFigureOut">
               <a:rPr lang="en-US" dirty="0"/>
-              <a:t>1/9/26</a:t>
+              <a:t>1/12/26</a:t>
             </a:fld>
             <a:endParaRPr lang="en-US" dirty="0"/>
           </a:p>
@@ -11160,7 +11329,7 @@
           <a:p>
             <a:fld id="{76E86A4C-8E40-4F87-A4F0-01A0687C5742}" type="datetimeFigureOut">
               <a:rPr lang="en-US" dirty="0"/>
-              <a:t>1/9/26</a:t>
+              <a:t>1/12/26</a:t>
             </a:fld>
             <a:endParaRPr lang="en-US" dirty="0"/>
           </a:p>
@@ -12271,7 +12440,7 @@
           <a:p>
             <a:fld id="{35E72C73-2D91-4E12-BA25-F0AA0C03599B}" type="datetimeFigureOut">
               <a:rPr lang="en-US" dirty="0"/>
-              <a:t>1/9/26</a:t>
+              <a:t>1/12/26</a:t>
             </a:fld>
             <a:endParaRPr lang="en-US" dirty="0"/>
           </a:p>
@@ -13327,7 +13496,7 @@
           <a:p>
             <a:fld id="{2BE451C3-0FF4-47C4-B829-773ADF60F88C}" type="datetimeFigureOut">
               <a:rPr lang="en-US" dirty="0"/>
-              <a:t>1/9/26</a:t>
+              <a:t>1/12/26</a:t>
             </a:fld>
             <a:endParaRPr lang="en-US" dirty="0"/>
           </a:p>
@@ -13966,6 +14135,1086 @@
 </file>
 
 <file path=ppt/slides/slide2.xml><?xml version="1.0" encoding="utf-8"?>
+<p:sld xmlns:a="http://schemas.openxmlformats.org/drawingml/2006/main" xmlns:r="http://schemas.openxmlformats.org/officeDocument/2006/relationships" xmlns:p="http://schemas.openxmlformats.org/presentationml/2006/main">
+  <p:cSld>
+    <p:spTree>
+      <p:nvGrpSpPr>
+        <p:cNvPr id="1" name=""/>
+        <p:cNvGrpSpPr/>
+        <p:nvPr/>
+      </p:nvGrpSpPr>
+      <p:grpSpPr>
+        <a:xfrm>
+          <a:off x="0" y="0"/>
+          <a:ext cx="0" cy="0"/>
+          <a:chOff x="0" y="0"/>
+          <a:chExt cx="0" cy="0"/>
+        </a:xfrm>
+      </p:grpSpPr>
+      <p:sp>
+        <p:nvSpPr>
+          <p:cNvPr id="2" name="Title 1">
+            <a:extLst>
+              <a:ext uri="{FF2B5EF4-FFF2-40B4-BE49-F238E27FC236}">
+                <a16:creationId xmlns:a16="http://schemas.microsoft.com/office/drawing/2014/main" id="{09C3BC8F-59F9-A958-1DD2-EA7D33C5B6ED}"/>
+              </a:ext>
+            </a:extLst>
+          </p:cNvPr>
+          <p:cNvSpPr>
+            <a:spLocks noGrp="1"/>
+          </p:cNvSpPr>
+          <p:nvPr>
+            <p:ph type="title"/>
+          </p:nvPr>
+        </p:nvSpPr>
+        <p:spPr>
+          <a:xfrm>
+            <a:off x="1154954" y="973668"/>
+            <a:ext cx="9394513" cy="706964"/>
+          </a:xfrm>
+        </p:spPr>
+        <p:txBody>
+          <a:bodyPr/>
+          <a:lstStyle/>
+          <a:p>
+            <a:r>
+              <a:rPr lang="en-US" dirty="0"/>
+              <a:t>General Overview of Solution Presented</a:t>
+            </a:r>
+          </a:p>
+        </p:txBody>
+      </p:sp>
+      <p:sp>
+        <p:nvSpPr>
+          <p:cNvPr id="3" name="Text Placeholder 2">
+            <a:extLst>
+              <a:ext uri="{FF2B5EF4-FFF2-40B4-BE49-F238E27FC236}">
+                <a16:creationId xmlns:a16="http://schemas.microsoft.com/office/drawing/2014/main" id="{BF4C948E-9B3C-2EE1-1387-C9C7DC5EABC8}"/>
+              </a:ext>
+            </a:extLst>
+          </p:cNvPr>
+          <p:cNvSpPr>
+            <a:spLocks noGrp="1"/>
+          </p:cNvSpPr>
+          <p:nvPr>
+            <p:ph type="body" idx="1"/>
+          </p:nvPr>
+        </p:nvSpPr>
+        <p:spPr>
+          <a:xfrm>
+            <a:off x="1154954" y="3238500"/>
+            <a:ext cx="4825157" cy="576262"/>
+          </a:xfrm>
+        </p:spPr>
+        <p:txBody>
+          <a:bodyPr/>
+          <a:lstStyle/>
+          <a:p>
+            <a:r>
+              <a:rPr lang="en-US" dirty="0">
+                <a:latin typeface="Cambria Math" panose="02040503050406030204" pitchFamily="18" charset="0"/>
+                <a:ea typeface="Cambria Math" panose="02040503050406030204" pitchFamily="18" charset="0"/>
+              </a:rPr>
+              <a:t>Problem with Previous Method:</a:t>
+            </a:r>
+          </a:p>
+        </p:txBody>
+      </p:sp>
+      <p:sp>
+        <p:nvSpPr>
+          <p:cNvPr id="4" name="Content Placeholder 3">
+            <a:extLst>
+              <a:ext uri="{FF2B5EF4-FFF2-40B4-BE49-F238E27FC236}">
+                <a16:creationId xmlns:a16="http://schemas.microsoft.com/office/drawing/2014/main" id="{BC74CEE0-717C-E600-8E6D-923CBB08C5D2}"/>
+              </a:ext>
+            </a:extLst>
+          </p:cNvPr>
+          <p:cNvSpPr>
+            <a:spLocks noGrp="1"/>
+          </p:cNvSpPr>
+          <p:nvPr>
+            <p:ph sz="half" idx="2"/>
+          </p:nvPr>
+        </p:nvSpPr>
+        <p:spPr>
+          <a:xfrm>
+            <a:off x="1154954" y="3814762"/>
+            <a:ext cx="4825158" cy="2840039"/>
+          </a:xfrm>
+        </p:spPr>
+        <p:txBody>
+          <a:bodyPr/>
+          <a:lstStyle/>
+          <a:p>
+            <a:r>
+              <a:rPr lang="en-US" sz="2000" dirty="0">
+                <a:solidFill>
+                  <a:schemeClr val="tx1"/>
+                </a:solidFill>
+                <a:latin typeface="Cambria Math" panose="02040503050406030204" pitchFamily="18" charset="0"/>
+                <a:ea typeface="Cambria Math" panose="02040503050406030204" pitchFamily="18" charset="0"/>
+              </a:rPr>
+              <a:t>Tried to fit all four coefficients of ODE without good starting estimates for their values</a:t>
+            </a:r>
+          </a:p>
+          <a:p>
+            <a:r>
+              <a:rPr lang="en-US" sz="2000" dirty="0">
+                <a:solidFill>
+                  <a:schemeClr val="tx1"/>
+                </a:solidFill>
+                <a:latin typeface="Cambria Math" panose="02040503050406030204" pitchFamily="18" charset="0"/>
+                <a:ea typeface="Cambria Math" panose="02040503050406030204" pitchFamily="18" charset="0"/>
+              </a:rPr>
+              <a:t>Experienced coefficient convergence instability based on starting estimates</a:t>
+            </a:r>
+          </a:p>
+          <a:p>
+            <a:r>
+              <a:rPr lang="en-US" sz="2000" dirty="0">
+                <a:solidFill>
+                  <a:schemeClr val="tx1"/>
+                </a:solidFill>
+                <a:latin typeface="Cambria Math" panose="02040503050406030204" pitchFamily="18" charset="0"/>
+                <a:ea typeface="Cambria Math" panose="02040503050406030204" pitchFamily="18" charset="0"/>
+              </a:rPr>
+              <a:t>Fits to data were just ok</a:t>
+            </a:r>
+          </a:p>
+          <a:p>
+            <a:endParaRPr lang="en-US" dirty="0"/>
+          </a:p>
+        </p:txBody>
+      </p:sp>
+      <p:sp>
+        <p:nvSpPr>
+          <p:cNvPr id="5" name="Text Placeholder 4">
+            <a:extLst>
+              <a:ext uri="{FF2B5EF4-FFF2-40B4-BE49-F238E27FC236}">
+                <a16:creationId xmlns:a16="http://schemas.microsoft.com/office/drawing/2014/main" id="{AE4C0669-7E13-07A7-BCD9-AF695691DBD9}"/>
+              </a:ext>
+            </a:extLst>
+          </p:cNvPr>
+          <p:cNvSpPr>
+            <a:spLocks noGrp="1"/>
+          </p:cNvSpPr>
+          <p:nvPr>
+            <p:ph type="body" sz="quarter" idx="3"/>
+          </p:nvPr>
+        </p:nvSpPr>
+        <p:spPr>
+          <a:xfrm>
+            <a:off x="6208712" y="3238500"/>
+            <a:ext cx="4825159" cy="576262"/>
+          </a:xfrm>
+        </p:spPr>
+        <p:txBody>
+          <a:bodyPr/>
+          <a:lstStyle/>
+          <a:p>
+            <a:r>
+              <a:rPr lang="en-US" dirty="0">
+                <a:latin typeface="Cambria Math" panose="02040503050406030204" pitchFamily="18" charset="0"/>
+                <a:ea typeface="Cambria Math" panose="02040503050406030204" pitchFamily="18" charset="0"/>
+              </a:rPr>
+              <a:t>Solution Presented:</a:t>
+            </a:r>
+          </a:p>
+        </p:txBody>
+      </p:sp>
+      <mc:AlternateContent xmlns:mc="http://schemas.openxmlformats.org/markup-compatibility/2006">
+        <mc:Choice xmlns:a14="http://schemas.microsoft.com/office/drawing/2010/main" Requires="a14">
+          <p:sp>
+            <p:nvSpPr>
+              <p:cNvPr id="6" name="Content Placeholder 5">
+                <a:extLst>
+                  <a:ext uri="{FF2B5EF4-FFF2-40B4-BE49-F238E27FC236}">
+                    <a16:creationId xmlns:a16="http://schemas.microsoft.com/office/drawing/2014/main" id="{E80BFC9F-B0FE-4F0D-5639-512B486560CB}"/>
+                  </a:ext>
+                </a:extLst>
+              </p:cNvPr>
+              <p:cNvSpPr>
+                <a:spLocks noGrp="1"/>
+              </p:cNvSpPr>
+              <p:nvPr>
+                <p:ph sz="quarter" idx="4"/>
+              </p:nvPr>
+            </p:nvSpPr>
+            <p:spPr>
+              <a:xfrm>
+                <a:off x="6208712" y="3814762"/>
+                <a:ext cx="4825159" cy="2840039"/>
+              </a:xfrm>
+            </p:spPr>
+            <p:txBody>
+              <a:bodyPr>
+                <a:normAutofit/>
+              </a:bodyPr>
+              <a:lstStyle/>
+              <a:p>
+                <a:r>
+                  <a:rPr lang="en-US" sz="2000" dirty="0">
+                    <a:solidFill>
+                      <a:schemeClr val="tx1"/>
+                    </a:solidFill>
+                    <a:latin typeface="Cambria Math" panose="02040503050406030204" pitchFamily="18" charset="0"/>
+                    <a:ea typeface="Cambria Math" panose="02040503050406030204" pitchFamily="18" charset="0"/>
+                  </a:rPr>
+                  <a:t>Use data to provide good starting estimates for </a:t>
+                </a:r>
+                <a14:m>
+                  <m:oMath xmlns:m="http://schemas.openxmlformats.org/officeDocument/2006/math">
+                    <m:r>
+                      <a:rPr lang="en-US" sz="2000" i="1">
+                        <a:solidFill>
+                          <a:schemeClr val="tx2"/>
+                        </a:solidFill>
+                        <a:latin typeface="Cambria Math" panose="02040503050406030204" pitchFamily="18" charset="0"/>
+                        <a:ea typeface="Cambria Math" panose="02040503050406030204" pitchFamily="18" charset="0"/>
+                      </a:rPr>
+                      <m:t>𝛾</m:t>
+                    </m:r>
+                  </m:oMath>
+                </a14:m>
+                <a:r>
+                  <a:rPr lang="en-US" sz="2000" i="1" dirty="0">
+                    <a:solidFill>
+                      <a:schemeClr val="tx2"/>
+                    </a:solidFill>
+                    <a:latin typeface="Cambria Math" panose="02040503050406030204" pitchFamily="18" charset="0"/>
+                    <a:ea typeface="Cambria Math" panose="02040503050406030204" pitchFamily="18" charset="0"/>
+                  </a:rPr>
+                  <a:t> </a:t>
+                </a:r>
+                <a:r>
+                  <a:rPr lang="en-US" sz="2000" dirty="0">
+                    <a:solidFill>
+                      <a:schemeClr val="tx2"/>
+                    </a:solidFill>
+                    <a:latin typeface="Cambria Math" panose="02040503050406030204" pitchFamily="18" charset="0"/>
+                    <a:ea typeface="Cambria Math" panose="02040503050406030204" pitchFamily="18" charset="0"/>
+                  </a:rPr>
+                  <a:t>and</a:t>
+                </a:r>
+                <a:r>
+                  <a:rPr lang="en-US" sz="2000" i="1" dirty="0">
+                    <a:solidFill>
+                      <a:schemeClr val="tx2"/>
+                    </a:solidFill>
+                    <a:latin typeface="Cambria Math" panose="02040503050406030204" pitchFamily="18" charset="0"/>
+                    <a:ea typeface="Cambria Math" panose="02040503050406030204" pitchFamily="18" charset="0"/>
+                  </a:rPr>
+                  <a:t> </a:t>
+                </a:r>
+                <a14:m>
+                  <m:oMath xmlns:m="http://schemas.openxmlformats.org/officeDocument/2006/math">
+                    <m:r>
+                      <a:rPr lang="en-US" sz="2000" i="1">
+                        <a:solidFill>
+                          <a:schemeClr val="tx2"/>
+                        </a:solidFill>
+                        <a:latin typeface="Cambria Math" panose="02040503050406030204" pitchFamily="18" charset="0"/>
+                        <a:ea typeface="Cambria Math" panose="02040503050406030204" pitchFamily="18" charset="0"/>
+                      </a:rPr>
+                      <m:t>𝜔</m:t>
+                    </m:r>
+                  </m:oMath>
+                </a14:m>
+                <a:endParaRPr lang="en-US" sz="2000" dirty="0">
+                  <a:solidFill>
+                    <a:schemeClr val="tx1"/>
+                  </a:solidFill>
+                  <a:latin typeface="Cambria Math" panose="02040503050406030204" pitchFamily="18" charset="0"/>
+                  <a:ea typeface="Cambria Math" panose="02040503050406030204" pitchFamily="18" charset="0"/>
+                </a:endParaRPr>
+              </a:p>
+              <a:p>
+                <a:r>
+                  <a:rPr lang="en-US" sz="2000" dirty="0">
+                    <a:solidFill>
+                      <a:schemeClr val="tx1"/>
+                    </a:solidFill>
+                    <a:latin typeface="Cambria Math" panose="02040503050406030204" pitchFamily="18" charset="0"/>
+                    <a:ea typeface="Cambria Math" panose="02040503050406030204" pitchFamily="18" charset="0"/>
+                  </a:rPr>
+                  <a:t>Use the obtained estimates for </a:t>
+                </a:r>
+                <a14:m>
+                  <m:oMath xmlns:m="http://schemas.openxmlformats.org/officeDocument/2006/math">
+                    <m:r>
+                      <a:rPr lang="en-US" sz="2000" i="1">
+                        <a:solidFill>
+                          <a:schemeClr val="tx2"/>
+                        </a:solidFill>
+                        <a:latin typeface="Cambria Math" panose="02040503050406030204" pitchFamily="18" charset="0"/>
+                        <a:ea typeface="Cambria Math" panose="02040503050406030204" pitchFamily="18" charset="0"/>
+                      </a:rPr>
+                      <m:t>𝛾</m:t>
+                    </m:r>
+                  </m:oMath>
+                </a14:m>
+                <a:r>
+                  <a:rPr lang="en-US" sz="2000" i="1" dirty="0">
+                    <a:solidFill>
+                      <a:schemeClr val="tx2"/>
+                    </a:solidFill>
+                    <a:latin typeface="Cambria Math" panose="02040503050406030204" pitchFamily="18" charset="0"/>
+                    <a:ea typeface="Cambria Math" panose="02040503050406030204" pitchFamily="18" charset="0"/>
+                  </a:rPr>
+                  <a:t> </a:t>
+                </a:r>
+                <a:r>
+                  <a:rPr lang="en-US" sz="2000" dirty="0">
+                    <a:solidFill>
+                      <a:schemeClr val="tx2"/>
+                    </a:solidFill>
+                    <a:latin typeface="Cambria Math" panose="02040503050406030204" pitchFamily="18" charset="0"/>
+                    <a:ea typeface="Cambria Math" panose="02040503050406030204" pitchFamily="18" charset="0"/>
+                  </a:rPr>
+                  <a:t>and</a:t>
+                </a:r>
+                <a:r>
+                  <a:rPr lang="en-US" sz="2000" i="1" dirty="0">
+                    <a:solidFill>
+                      <a:schemeClr val="tx2"/>
+                    </a:solidFill>
+                    <a:latin typeface="Cambria Math" panose="02040503050406030204" pitchFamily="18" charset="0"/>
+                    <a:ea typeface="Cambria Math" panose="02040503050406030204" pitchFamily="18" charset="0"/>
+                  </a:rPr>
+                  <a:t> </a:t>
+                </a:r>
+                <a14:m>
+                  <m:oMath xmlns:m="http://schemas.openxmlformats.org/officeDocument/2006/math">
+                    <m:r>
+                      <a:rPr lang="en-US" sz="2000" i="1">
+                        <a:solidFill>
+                          <a:schemeClr val="tx2"/>
+                        </a:solidFill>
+                        <a:latin typeface="Cambria Math" panose="02040503050406030204" pitchFamily="18" charset="0"/>
+                        <a:ea typeface="Cambria Math" panose="02040503050406030204" pitchFamily="18" charset="0"/>
+                      </a:rPr>
+                      <m:t>𝜔</m:t>
+                    </m:r>
+                  </m:oMath>
+                </a14:m>
+                <a:r>
+                  <a:rPr lang="en-US" sz="2000" dirty="0">
+                    <a:solidFill>
+                      <a:schemeClr val="tx1"/>
+                    </a:solidFill>
+                    <a:latin typeface="Cambria Math" panose="02040503050406030204" pitchFamily="18" charset="0"/>
+                    <a:ea typeface="Cambria Math" panose="02040503050406030204" pitchFamily="18" charset="0"/>
+                  </a:rPr>
+                  <a:t> to analytically solve for ODE coefficients </a:t>
+                </a:r>
+                <a14:m>
+                  <m:oMath xmlns:m="http://schemas.openxmlformats.org/officeDocument/2006/math">
+                    <m:sSub>
+                      <m:sSubPr>
+                        <m:ctrlPr>
+                          <a:rPr lang="en-US" sz="2000" b="0" i="1" smtClean="0">
+                            <a:solidFill>
+                              <a:schemeClr val="tx1"/>
+                            </a:solidFill>
+                            <a:latin typeface="Cambria Math" panose="02040503050406030204" pitchFamily="18" charset="0"/>
+                            <a:ea typeface="Cambria Math" panose="02040503050406030204" pitchFamily="18" charset="0"/>
+                          </a:rPr>
+                        </m:ctrlPr>
+                      </m:sSubPr>
+                      <m:e>
+                        <m:r>
+                          <a:rPr lang="en-US" sz="2000" b="0" i="1" smtClean="0">
+                            <a:solidFill>
+                              <a:schemeClr val="tx1"/>
+                            </a:solidFill>
+                            <a:latin typeface="Cambria Math" panose="02040503050406030204" pitchFamily="18" charset="0"/>
+                            <a:ea typeface="Cambria Math" panose="02040503050406030204" pitchFamily="18" charset="0"/>
+                          </a:rPr>
+                          <m:t>𝐶</m:t>
+                        </m:r>
+                      </m:e>
+                      <m:sub>
+                        <m:r>
+                          <a:rPr lang="en-US" sz="2000" b="0" i="1" smtClean="0">
+                            <a:solidFill>
+                              <a:schemeClr val="tx1"/>
+                            </a:solidFill>
+                            <a:latin typeface="Cambria Math" panose="02040503050406030204" pitchFamily="18" charset="0"/>
+                            <a:ea typeface="Cambria Math" panose="02040503050406030204" pitchFamily="18" charset="0"/>
+                          </a:rPr>
+                          <m:t>1</m:t>
+                        </m:r>
+                      </m:sub>
+                    </m:sSub>
+                  </m:oMath>
+                </a14:m>
+                <a:r>
+                  <a:rPr lang="en-US" sz="2000" dirty="0">
+                    <a:solidFill>
+                      <a:schemeClr val="tx2"/>
+                    </a:solidFill>
+                    <a:latin typeface="Cambria Math" panose="02040503050406030204" pitchFamily="18" charset="0"/>
+                    <a:ea typeface="Cambria Math" panose="02040503050406030204" pitchFamily="18" charset="0"/>
+                  </a:rPr>
+                  <a:t>and</a:t>
+                </a:r>
+                <a:r>
+                  <a:rPr lang="en-US" sz="2000" i="1" dirty="0">
+                    <a:solidFill>
+                      <a:schemeClr val="tx2"/>
+                    </a:solidFill>
+                    <a:latin typeface="Cambria Math" panose="02040503050406030204" pitchFamily="18" charset="0"/>
+                    <a:ea typeface="Cambria Math" panose="02040503050406030204" pitchFamily="18" charset="0"/>
+                  </a:rPr>
+                  <a:t> </a:t>
+                </a:r>
+                <a14:m>
+                  <m:oMath xmlns:m="http://schemas.openxmlformats.org/officeDocument/2006/math">
+                    <m:sSub>
+                      <m:sSubPr>
+                        <m:ctrlPr>
+                          <a:rPr lang="en-US" sz="2000" b="0" i="1" smtClean="0">
+                            <a:solidFill>
+                              <a:schemeClr val="tx2"/>
+                            </a:solidFill>
+                            <a:latin typeface="Cambria Math" panose="02040503050406030204" pitchFamily="18" charset="0"/>
+                            <a:ea typeface="Cambria Math" panose="02040503050406030204" pitchFamily="18" charset="0"/>
+                          </a:rPr>
+                        </m:ctrlPr>
+                      </m:sSubPr>
+                      <m:e>
+                        <m:r>
+                          <a:rPr lang="en-US" sz="2000" b="0" i="1" smtClean="0">
+                            <a:solidFill>
+                              <a:schemeClr val="tx2"/>
+                            </a:solidFill>
+                            <a:latin typeface="Cambria Math" panose="02040503050406030204" pitchFamily="18" charset="0"/>
+                            <a:ea typeface="Cambria Math" panose="02040503050406030204" pitchFamily="18" charset="0"/>
+                          </a:rPr>
+                          <m:t>𝐶</m:t>
+                        </m:r>
+                      </m:e>
+                      <m:sub>
+                        <m:r>
+                          <a:rPr lang="en-US" sz="2000" b="0" i="1" smtClean="0">
+                            <a:solidFill>
+                              <a:schemeClr val="tx2"/>
+                            </a:solidFill>
+                            <a:latin typeface="Cambria Math" panose="02040503050406030204" pitchFamily="18" charset="0"/>
+                            <a:ea typeface="Cambria Math" panose="02040503050406030204" pitchFamily="18" charset="0"/>
+                          </a:rPr>
+                          <m:t>2</m:t>
+                        </m:r>
+                      </m:sub>
+                    </m:sSub>
+                  </m:oMath>
+                </a14:m>
+                <a:r>
+                  <a:rPr lang="en-US" sz="2000" b="0" i="1" dirty="0">
+                    <a:solidFill>
+                      <a:schemeClr val="tx2"/>
+                    </a:solidFill>
+                    <a:latin typeface="Cambria Math" panose="02040503050406030204" pitchFamily="18" charset="0"/>
+                    <a:ea typeface="Cambria Math" panose="02040503050406030204" pitchFamily="18" charset="0"/>
+                  </a:rPr>
+                  <a:t>.</a:t>
+                </a:r>
+              </a:p>
+              <a:p>
+                <a:r>
+                  <a:rPr lang="en-US" sz="2000" dirty="0">
+                    <a:solidFill>
+                      <a:schemeClr val="tx2"/>
+                    </a:solidFill>
+                    <a:latin typeface="Cambria Math" panose="02040503050406030204" pitchFamily="18" charset="0"/>
+                    <a:ea typeface="Cambria Math" panose="02040503050406030204" pitchFamily="18" charset="0"/>
+                  </a:rPr>
+                  <a:t>Fit the data with starting estimates for </a:t>
+                </a:r>
+                <a14:m>
+                  <m:oMath xmlns:m="http://schemas.openxmlformats.org/officeDocument/2006/math">
+                    <m:r>
+                      <a:rPr lang="en-US" sz="2000" i="1">
+                        <a:solidFill>
+                          <a:schemeClr val="tx2"/>
+                        </a:solidFill>
+                        <a:latin typeface="Cambria Math" panose="02040503050406030204" pitchFamily="18" charset="0"/>
+                        <a:ea typeface="Cambria Math" panose="02040503050406030204" pitchFamily="18" charset="0"/>
+                      </a:rPr>
+                      <m:t>𝛾</m:t>
+                    </m:r>
+                    <m:r>
+                      <a:rPr lang="en-US" sz="2000" b="0" i="1" smtClean="0">
+                        <a:solidFill>
+                          <a:schemeClr val="tx2"/>
+                        </a:solidFill>
+                        <a:latin typeface="Cambria Math" panose="02040503050406030204" pitchFamily="18" charset="0"/>
+                        <a:ea typeface="Cambria Math" panose="02040503050406030204" pitchFamily="18" charset="0"/>
+                      </a:rPr>
+                      <m:t>, </m:t>
+                    </m:r>
+                    <m:r>
+                      <a:rPr lang="en-US" sz="2000" i="1">
+                        <a:solidFill>
+                          <a:schemeClr val="tx2"/>
+                        </a:solidFill>
+                        <a:latin typeface="Cambria Math" panose="02040503050406030204" pitchFamily="18" charset="0"/>
+                        <a:ea typeface="Cambria Math" panose="02040503050406030204" pitchFamily="18" charset="0"/>
+                      </a:rPr>
+                      <m:t>𝜔</m:t>
+                    </m:r>
+                  </m:oMath>
+                </a14:m>
+                <a:r>
+                  <a:rPr lang="en-US" sz="2000" b="0" dirty="0">
+                    <a:solidFill>
+                      <a:schemeClr val="tx2"/>
+                    </a:solidFill>
+                    <a:latin typeface="Cambria Math" panose="02040503050406030204" pitchFamily="18" charset="0"/>
+                    <a:ea typeface="Cambria Math" panose="02040503050406030204" pitchFamily="18" charset="0"/>
+                  </a:rPr>
+                  <a:t> and analytically found </a:t>
+                </a:r>
+                <a14:m>
+                  <m:oMath xmlns:m="http://schemas.openxmlformats.org/officeDocument/2006/math">
+                    <m:sSub>
+                      <m:sSubPr>
+                        <m:ctrlPr>
+                          <a:rPr lang="en-US" sz="2000" i="1">
+                            <a:solidFill>
+                              <a:schemeClr val="tx1"/>
+                            </a:solidFill>
+                            <a:latin typeface="Cambria Math" panose="02040503050406030204" pitchFamily="18" charset="0"/>
+                            <a:ea typeface="Cambria Math" panose="02040503050406030204" pitchFamily="18" charset="0"/>
+                          </a:rPr>
+                        </m:ctrlPr>
+                      </m:sSubPr>
+                      <m:e>
+                        <m:r>
+                          <a:rPr lang="en-US" sz="2000" i="1">
+                            <a:solidFill>
+                              <a:schemeClr val="tx1"/>
+                            </a:solidFill>
+                            <a:latin typeface="Cambria Math" panose="02040503050406030204" pitchFamily="18" charset="0"/>
+                            <a:ea typeface="Cambria Math" panose="02040503050406030204" pitchFamily="18" charset="0"/>
+                          </a:rPr>
+                          <m:t>𝐶</m:t>
+                        </m:r>
+                      </m:e>
+                      <m:sub>
+                        <m:r>
+                          <a:rPr lang="en-US" sz="2000" i="1">
+                            <a:solidFill>
+                              <a:schemeClr val="tx1"/>
+                            </a:solidFill>
+                            <a:latin typeface="Cambria Math" panose="02040503050406030204" pitchFamily="18" charset="0"/>
+                            <a:ea typeface="Cambria Math" panose="02040503050406030204" pitchFamily="18" charset="0"/>
+                          </a:rPr>
+                          <m:t>1</m:t>
+                        </m:r>
+                      </m:sub>
+                    </m:sSub>
+                  </m:oMath>
+                </a14:m>
+                <a:r>
+                  <a:rPr lang="en-US" sz="2000" dirty="0">
+                    <a:solidFill>
+                      <a:schemeClr val="tx2"/>
+                    </a:solidFill>
+                    <a:latin typeface="Cambria Math" panose="02040503050406030204" pitchFamily="18" charset="0"/>
+                    <a:ea typeface="Cambria Math" panose="02040503050406030204" pitchFamily="18" charset="0"/>
+                  </a:rPr>
+                  <a:t>and</a:t>
+                </a:r>
+                <a:r>
+                  <a:rPr lang="en-US" sz="2000" i="1" dirty="0">
+                    <a:solidFill>
+                      <a:schemeClr val="tx2"/>
+                    </a:solidFill>
+                    <a:latin typeface="Cambria Math" panose="02040503050406030204" pitchFamily="18" charset="0"/>
+                    <a:ea typeface="Cambria Math" panose="02040503050406030204" pitchFamily="18" charset="0"/>
+                  </a:rPr>
+                  <a:t> </a:t>
+                </a:r>
+                <a14:m>
+                  <m:oMath xmlns:m="http://schemas.openxmlformats.org/officeDocument/2006/math">
+                    <m:sSub>
+                      <m:sSubPr>
+                        <m:ctrlPr>
+                          <a:rPr lang="en-US" sz="2000" i="1">
+                            <a:solidFill>
+                              <a:schemeClr val="tx2"/>
+                            </a:solidFill>
+                            <a:latin typeface="Cambria Math" panose="02040503050406030204" pitchFamily="18" charset="0"/>
+                            <a:ea typeface="Cambria Math" panose="02040503050406030204" pitchFamily="18" charset="0"/>
+                          </a:rPr>
+                        </m:ctrlPr>
+                      </m:sSubPr>
+                      <m:e>
+                        <m:r>
+                          <a:rPr lang="en-US" sz="2000" i="1">
+                            <a:solidFill>
+                              <a:schemeClr val="tx2"/>
+                            </a:solidFill>
+                            <a:latin typeface="Cambria Math" panose="02040503050406030204" pitchFamily="18" charset="0"/>
+                            <a:ea typeface="Cambria Math" panose="02040503050406030204" pitchFamily="18" charset="0"/>
+                          </a:rPr>
+                          <m:t>𝐶</m:t>
+                        </m:r>
+                      </m:e>
+                      <m:sub>
+                        <m:r>
+                          <a:rPr lang="en-US" sz="2000" i="1">
+                            <a:solidFill>
+                              <a:schemeClr val="tx2"/>
+                            </a:solidFill>
+                            <a:latin typeface="Cambria Math" panose="02040503050406030204" pitchFamily="18" charset="0"/>
+                            <a:ea typeface="Cambria Math" panose="02040503050406030204" pitchFamily="18" charset="0"/>
+                          </a:rPr>
+                          <m:t>2</m:t>
+                        </m:r>
+                      </m:sub>
+                    </m:sSub>
+                    <m:r>
+                      <a:rPr lang="en-US" sz="2000" b="0" i="1" smtClean="0">
+                        <a:solidFill>
+                          <a:schemeClr val="tx2"/>
+                        </a:solidFill>
+                        <a:latin typeface="Cambria Math" panose="02040503050406030204" pitchFamily="18" charset="0"/>
+                        <a:ea typeface="Cambria Math" panose="02040503050406030204" pitchFamily="18" charset="0"/>
+                      </a:rPr>
+                      <m:t>.</m:t>
+                    </m:r>
+                  </m:oMath>
+                </a14:m>
+                <a:endParaRPr lang="en-US" sz="2000" b="0" dirty="0">
+                  <a:solidFill>
+                    <a:schemeClr val="tx2"/>
+                  </a:solidFill>
+                  <a:latin typeface="Cambria Math" panose="02040503050406030204" pitchFamily="18" charset="0"/>
+                  <a:ea typeface="Cambria Math" panose="02040503050406030204" pitchFamily="18" charset="0"/>
+                </a:endParaRPr>
+              </a:p>
+              <a:p>
+                <a:endParaRPr lang="en-US" sz="2000" b="0" i="1" dirty="0">
+                  <a:solidFill>
+                    <a:schemeClr val="tx2"/>
+                  </a:solidFill>
+                  <a:latin typeface="Cambria Math" panose="02040503050406030204" pitchFamily="18" charset="0"/>
+                  <a:ea typeface="Cambria Math" panose="02040503050406030204" pitchFamily="18" charset="0"/>
+                </a:endParaRPr>
+              </a:p>
+              <a:p>
+                <a:endParaRPr lang="en-US" sz="2000" dirty="0">
+                  <a:solidFill>
+                    <a:schemeClr val="tx1"/>
+                  </a:solidFill>
+                  <a:latin typeface="Cambria Math" panose="02040503050406030204" pitchFamily="18" charset="0"/>
+                  <a:ea typeface="Cambria Math" panose="02040503050406030204" pitchFamily="18" charset="0"/>
+                </a:endParaRPr>
+              </a:p>
+            </p:txBody>
+          </p:sp>
+        </mc:Choice>
+        <mc:Fallback>
+          <p:sp>
+            <p:nvSpPr>
+              <p:cNvPr id="6" name="Content Placeholder 5">
+                <a:extLst>
+                  <a:ext uri="{FF2B5EF4-FFF2-40B4-BE49-F238E27FC236}">
+                    <a16:creationId xmlns:a16="http://schemas.microsoft.com/office/drawing/2014/main" id="{E80BFC9F-B0FE-4F0D-5639-512B486560CB}"/>
+                  </a:ext>
+                </a:extLst>
+              </p:cNvPr>
+              <p:cNvSpPr>
+                <a:spLocks noGrp="1" noRot="1" noChangeAspect="1" noMove="1" noResize="1" noEditPoints="1" noAdjustHandles="1" noChangeArrowheads="1" noChangeShapeType="1" noTextEdit="1"/>
+              </p:cNvSpPr>
+              <p:nvPr>
+                <p:ph sz="quarter" idx="4"/>
+              </p:nvPr>
+            </p:nvSpPr>
+            <p:spPr>
+              <a:xfrm>
+                <a:off x="6208712" y="3814762"/>
+                <a:ext cx="4825159" cy="2840039"/>
+              </a:xfrm>
+              <a:blipFill>
+                <a:blip r:embed="rId3"/>
+                <a:stretch>
+                  <a:fillRect l="-525" t="-1333"/>
+                </a:stretch>
+              </a:blipFill>
+            </p:spPr>
+            <p:txBody>
+              <a:bodyPr/>
+              <a:lstStyle/>
+              <a:p>
+                <a:r>
+                  <a:rPr lang="en-US">
+                    <a:noFill/>
+                  </a:rPr>
+                  <a:t> </a:t>
+                </a:r>
+              </a:p>
+            </p:txBody>
+          </p:sp>
+        </mc:Fallback>
+      </mc:AlternateContent>
+      <mc:AlternateContent xmlns:mc="http://schemas.openxmlformats.org/markup-compatibility/2006">
+        <mc:Choice xmlns:a14="http://schemas.microsoft.com/office/drawing/2010/main" Requires="a14">
+          <p:sp>
+            <p:nvSpPr>
+              <p:cNvPr id="7" name="TextBox 6">
+                <a:extLst>
+                  <a:ext uri="{FF2B5EF4-FFF2-40B4-BE49-F238E27FC236}">
+                    <a16:creationId xmlns:a16="http://schemas.microsoft.com/office/drawing/2014/main" id="{47785961-BC9D-9AA0-2534-01C714A5F320}"/>
+                  </a:ext>
+                </a:extLst>
+              </p:cNvPr>
+              <p:cNvSpPr txBox="1"/>
+              <p:nvPr/>
+            </p:nvSpPr>
+            <p:spPr>
+              <a:xfrm>
+                <a:off x="1560708" y="2400577"/>
+                <a:ext cx="9296006" cy="1124988"/>
+              </a:xfrm>
+              <a:prstGeom prst="rect">
+                <a:avLst/>
+              </a:prstGeom>
+              <a:noFill/>
+            </p:spPr>
+            <p:txBody>
+              <a:bodyPr wrap="none" rtlCol="0">
+                <a:spAutoFit/>
+              </a:bodyPr>
+              <a:lstStyle/>
+              <a:p>
+                <a:r>
+                  <a:rPr lang="en-US" sz="2400" dirty="0">
+                    <a:solidFill>
+                      <a:schemeClr val="accent1"/>
+                    </a:solidFill>
+                    <a:latin typeface="Cambria Math" panose="02040503050406030204" pitchFamily="18" charset="0"/>
+                    <a:ea typeface="Cambria Math" panose="02040503050406030204" pitchFamily="18" charset="0"/>
+                  </a:rPr>
+                  <a:t>Goal: Fit tail of provided data to the ODE to obtain values for </a:t>
+                </a:r>
+                <a14:m>
+                  <m:oMath xmlns:m="http://schemas.openxmlformats.org/officeDocument/2006/math">
+                    <m:r>
+                      <a:rPr lang="en-US" sz="2400" i="1">
+                        <a:solidFill>
+                          <a:schemeClr val="accent1"/>
+                        </a:solidFill>
+                        <a:latin typeface="Cambria Math" panose="02040503050406030204" pitchFamily="18" charset="0"/>
+                        <a:ea typeface="Cambria Math" panose="02040503050406030204" pitchFamily="18" charset="0"/>
+                      </a:rPr>
+                      <m:t>𝛾</m:t>
+                    </m:r>
+                  </m:oMath>
+                </a14:m>
+                <a:r>
+                  <a:rPr lang="en-US" sz="2400" i="1" dirty="0">
+                    <a:solidFill>
+                      <a:schemeClr val="accent1"/>
+                    </a:solidFill>
+                    <a:latin typeface="Cambria Math" panose="02040503050406030204" pitchFamily="18" charset="0"/>
+                    <a:ea typeface="Cambria Math" panose="02040503050406030204" pitchFamily="18" charset="0"/>
+                  </a:rPr>
+                  <a:t> </a:t>
+                </a:r>
+                <a:r>
+                  <a:rPr lang="en-US" sz="2400" dirty="0">
+                    <a:solidFill>
+                      <a:schemeClr val="accent1"/>
+                    </a:solidFill>
+                    <a:latin typeface="Cambria Math" panose="02040503050406030204" pitchFamily="18" charset="0"/>
+                    <a:ea typeface="Cambria Math" panose="02040503050406030204" pitchFamily="18" charset="0"/>
+                  </a:rPr>
+                  <a:t>and</a:t>
+                </a:r>
+                <a:r>
+                  <a:rPr lang="en-US" sz="2400" i="1" dirty="0">
+                    <a:solidFill>
+                      <a:schemeClr val="accent1"/>
+                    </a:solidFill>
+                    <a:latin typeface="Cambria Math" panose="02040503050406030204" pitchFamily="18" charset="0"/>
+                    <a:ea typeface="Cambria Math" panose="02040503050406030204" pitchFamily="18" charset="0"/>
+                  </a:rPr>
+                  <a:t> </a:t>
+                </a:r>
+                <a14:m>
+                  <m:oMath xmlns:m="http://schemas.openxmlformats.org/officeDocument/2006/math">
+                    <m:r>
+                      <a:rPr lang="en-US" sz="2400" i="1">
+                        <a:solidFill>
+                          <a:schemeClr val="accent1"/>
+                        </a:solidFill>
+                        <a:latin typeface="Cambria Math" panose="02040503050406030204" pitchFamily="18" charset="0"/>
+                        <a:ea typeface="Cambria Math" panose="02040503050406030204" pitchFamily="18" charset="0"/>
+                      </a:rPr>
+                      <m:t>𝜔</m:t>
+                    </m:r>
+                    <m:r>
+                      <a:rPr lang="en-US" sz="2400" i="1">
+                        <a:solidFill>
+                          <a:schemeClr val="accent1"/>
+                        </a:solidFill>
+                        <a:latin typeface="Cambria Math" panose="02040503050406030204" pitchFamily="18" charset="0"/>
+                        <a:ea typeface="Cambria Math" panose="02040503050406030204" pitchFamily="18" charset="0"/>
+                      </a:rPr>
+                      <m:t> </m:t>
+                    </m:r>
+                  </m:oMath>
+                </a14:m>
+                <a:r>
+                  <a:rPr lang="en-US" sz="2400" dirty="0">
+                    <a:solidFill>
+                      <a:schemeClr val="accent1"/>
+                    </a:solidFill>
+                    <a:latin typeface="Cambria Math" panose="02040503050406030204" pitchFamily="18" charset="0"/>
+                    <a:ea typeface="Cambria Math" panose="02040503050406030204" pitchFamily="18" charset="0"/>
+                  </a:rPr>
+                  <a:t>:</a:t>
+                </a:r>
+              </a:p>
+              <a:p>
+                <a:pPr algn="ctr"/>
+                <a14:m>
+                  <m:oMath xmlns:m="http://schemas.openxmlformats.org/officeDocument/2006/math">
+                    <m:acc>
+                      <m:accPr>
+                        <m:chr m:val="̈"/>
+                        <m:ctrlPr>
+                          <a:rPr lang="en-US" sz="2400" i="1">
+                            <a:solidFill>
+                              <a:schemeClr val="tx1"/>
+                            </a:solidFill>
+                            <a:latin typeface="Cambria Math" panose="02040503050406030204" pitchFamily="18" charset="0"/>
+                            <a:ea typeface="Cambria Math" panose="02040503050406030204" pitchFamily="18" charset="0"/>
+                          </a:rPr>
+                        </m:ctrlPr>
+                      </m:accPr>
+                      <m:e>
+                        <m:r>
+                          <m:rPr>
+                            <m:sty m:val="p"/>
+                          </m:rPr>
+                          <a:rPr lang="en-US" sz="2400">
+                            <a:solidFill>
+                              <a:schemeClr val="tx1"/>
+                            </a:solidFill>
+                            <a:latin typeface="Cambria Math" panose="02040503050406030204" pitchFamily="18" charset="0"/>
+                            <a:ea typeface="Cambria Math" panose="02040503050406030204" pitchFamily="18" charset="0"/>
+                          </a:rPr>
+                          <m:t>ϕ</m:t>
+                        </m:r>
+                      </m:e>
+                    </m:acc>
+                    <m:r>
+                      <a:rPr lang="en-US" sz="2400">
+                        <a:solidFill>
+                          <a:schemeClr val="tx1"/>
+                        </a:solidFill>
+                        <a:latin typeface="Cambria Math" panose="02040503050406030204" pitchFamily="18" charset="0"/>
+                        <a:ea typeface="Cambria Math" panose="02040503050406030204" pitchFamily="18" charset="0"/>
+                      </a:rPr>
+                      <m:t>  + 2</m:t>
+                    </m:r>
+                    <m:r>
+                      <m:rPr>
+                        <m:sty m:val="p"/>
+                      </m:rPr>
+                      <a:rPr lang="en-US" sz="2400">
+                        <a:solidFill>
+                          <a:schemeClr val="tx1"/>
+                        </a:solidFill>
+                        <a:latin typeface="Cambria Math" panose="02040503050406030204" pitchFamily="18" charset="0"/>
+                        <a:ea typeface="Cambria Math" panose="02040503050406030204" pitchFamily="18" charset="0"/>
+                      </a:rPr>
+                      <m:t>γ</m:t>
+                    </m:r>
+                    <m:acc>
+                      <m:accPr>
+                        <m:chr m:val="̇"/>
+                        <m:ctrlPr>
+                          <a:rPr lang="en-US" sz="2400" i="1">
+                            <a:solidFill>
+                              <a:schemeClr val="tx1"/>
+                            </a:solidFill>
+                            <a:latin typeface="Cambria Math" panose="02040503050406030204" pitchFamily="18" charset="0"/>
+                            <a:ea typeface="Cambria Math" panose="02040503050406030204" pitchFamily="18" charset="0"/>
+                          </a:rPr>
+                        </m:ctrlPr>
+                      </m:accPr>
+                      <m:e>
+                        <m:r>
+                          <m:rPr>
+                            <m:sty m:val="p"/>
+                          </m:rPr>
+                          <a:rPr lang="en-US" sz="2400">
+                            <a:solidFill>
+                              <a:schemeClr val="tx1"/>
+                            </a:solidFill>
+                            <a:latin typeface="Cambria Math" panose="02040503050406030204" pitchFamily="18" charset="0"/>
+                            <a:ea typeface="Cambria Math" panose="02040503050406030204" pitchFamily="18" charset="0"/>
+                          </a:rPr>
+                          <m:t>ϕ</m:t>
+                        </m:r>
+                      </m:e>
+                    </m:acc>
+                    <m:r>
+                      <a:rPr lang="en-US" sz="2400">
+                        <a:solidFill>
+                          <a:schemeClr val="tx1"/>
+                        </a:solidFill>
+                        <a:latin typeface="Cambria Math" panose="02040503050406030204" pitchFamily="18" charset="0"/>
+                        <a:ea typeface="Cambria Math" panose="02040503050406030204" pitchFamily="18" charset="0"/>
+                      </a:rPr>
+                      <m:t> + </m:t>
+                    </m:r>
+                    <m:sSup>
+                      <m:sSupPr>
+                        <m:ctrlPr>
+                          <a:rPr lang="en-US" sz="2400" i="1">
+                            <a:solidFill>
+                              <a:schemeClr val="tx1"/>
+                            </a:solidFill>
+                            <a:latin typeface="Cambria Math" panose="02040503050406030204" pitchFamily="18" charset="0"/>
+                            <a:ea typeface="Cambria Math" panose="02040503050406030204" pitchFamily="18" charset="0"/>
+                          </a:rPr>
+                        </m:ctrlPr>
+                      </m:sSupPr>
+                      <m:e>
+                        <m:r>
+                          <m:rPr>
+                            <m:sty m:val="p"/>
+                          </m:rPr>
+                          <a:rPr lang="en-US" sz="2400">
+                            <a:solidFill>
+                              <a:schemeClr val="tx1"/>
+                            </a:solidFill>
+                            <a:latin typeface="Cambria Math" panose="02040503050406030204" pitchFamily="18" charset="0"/>
+                            <a:ea typeface="Cambria Math" panose="02040503050406030204" pitchFamily="18" charset="0"/>
+                          </a:rPr>
+                          <m:t>ω</m:t>
+                        </m:r>
+                      </m:e>
+                      <m:sup>
+                        <m:r>
+                          <a:rPr lang="en-US" sz="2400">
+                            <a:solidFill>
+                              <a:schemeClr val="tx1"/>
+                            </a:solidFill>
+                            <a:latin typeface="Cambria Math" panose="02040503050406030204" pitchFamily="18" charset="0"/>
+                            <a:ea typeface="Cambria Math" panose="02040503050406030204" pitchFamily="18" charset="0"/>
+                          </a:rPr>
+                          <m:t>2</m:t>
+                        </m:r>
+                      </m:sup>
+                    </m:sSup>
+                    <m:r>
+                      <m:rPr>
+                        <m:sty m:val="p"/>
+                      </m:rPr>
+                      <a:rPr lang="en-US" sz="2400">
+                        <a:solidFill>
+                          <a:schemeClr val="tx1"/>
+                        </a:solidFill>
+                        <a:latin typeface="Cambria Math" panose="02040503050406030204" pitchFamily="18" charset="0"/>
+                        <a:ea typeface="Cambria Math" panose="02040503050406030204" pitchFamily="18" charset="0"/>
+                      </a:rPr>
+                      <m:t>ϕ</m:t>
+                    </m:r>
+                    <m:r>
+                      <a:rPr lang="en-US" sz="2400">
+                        <a:solidFill>
+                          <a:schemeClr val="tx1"/>
+                        </a:solidFill>
+                        <a:latin typeface="Cambria Math" panose="02040503050406030204" pitchFamily="18" charset="0"/>
+                        <a:ea typeface="Cambria Math" panose="02040503050406030204" pitchFamily="18" charset="0"/>
+                      </a:rPr>
+                      <m:t> = 0</m:t>
+                    </m:r>
+                  </m:oMath>
+                </a14:m>
+                <a:r>
+                  <a:rPr lang="en-US" sz="2400" dirty="0">
+                    <a:solidFill>
+                      <a:schemeClr val="tx1"/>
+                    </a:solidFill>
+                    <a:latin typeface="Cambria Math" panose="02040503050406030204" pitchFamily="18" charset="0"/>
+                    <a:ea typeface="Cambria Math" panose="02040503050406030204" pitchFamily="18" charset="0"/>
+                  </a:rPr>
+                  <a:t>.	(1)</a:t>
+                </a:r>
+              </a:p>
+              <a:p>
+                <a:endParaRPr lang="en-US" dirty="0"/>
+              </a:p>
+            </p:txBody>
+          </p:sp>
+        </mc:Choice>
+        <mc:Fallback>
+          <p:sp>
+            <p:nvSpPr>
+              <p:cNvPr id="7" name="TextBox 6">
+                <a:extLst>
+                  <a:ext uri="{FF2B5EF4-FFF2-40B4-BE49-F238E27FC236}">
+                    <a16:creationId xmlns:a16="http://schemas.microsoft.com/office/drawing/2014/main" id="{47785961-BC9D-9AA0-2534-01C714A5F320}"/>
+                  </a:ext>
+                </a:extLst>
+              </p:cNvPr>
+              <p:cNvSpPr txBox="1">
+                <a:spLocks noRot="1" noChangeAspect="1" noMove="1" noResize="1" noEditPoints="1" noAdjustHandles="1" noChangeArrowheads="1" noChangeShapeType="1" noTextEdit="1"/>
+              </p:cNvSpPr>
+              <p:nvPr/>
+            </p:nvSpPr>
+            <p:spPr>
+              <a:xfrm>
+                <a:off x="1560708" y="2400577"/>
+                <a:ext cx="9296006" cy="1124988"/>
+              </a:xfrm>
+              <a:prstGeom prst="rect">
+                <a:avLst/>
+              </a:prstGeom>
+              <a:blipFill>
+                <a:blip r:embed="rId4"/>
+                <a:stretch>
+                  <a:fillRect l="-955" t="-4494" r="-136"/>
+                </a:stretch>
+              </a:blipFill>
+            </p:spPr>
+            <p:txBody>
+              <a:bodyPr/>
+              <a:lstStyle/>
+              <a:p>
+                <a:r>
+                  <a:rPr lang="en-US">
+                    <a:noFill/>
+                  </a:rPr>
+                  <a:t> </a:t>
+                </a:r>
+              </a:p>
+            </p:txBody>
+          </p:sp>
+        </mc:Fallback>
+      </mc:AlternateContent>
+    </p:spTree>
+    <p:extLst>
+      <p:ext uri="{BB962C8B-B14F-4D97-AF65-F5344CB8AC3E}">
+        <p14:creationId xmlns:p14="http://schemas.microsoft.com/office/powerpoint/2010/main" val="2763739514"/>
+      </p:ext>
+    </p:extLst>
+  </p:cSld>
+  <p:clrMapOvr>
+    <a:masterClrMapping/>
+  </p:clrMapOvr>
+</p:sld>
+</file>
+
+<file path=ppt/slides/slide3.xml><?xml version="1.0" encoding="utf-8"?>
 <p:sld xmlns:a="http://schemas.openxmlformats.org/drawingml/2006/main" xmlns:r="http://schemas.openxmlformats.org/officeDocument/2006/relationships" xmlns:p="http://schemas.openxmlformats.org/presentationml/2006/main">
   <p:cSld>
     <p:bg>
@@ -15667,7 +16916,7 @@
               </a:lnSpc>
             </a:pPr>
             <a:r>
-              <a:rPr lang="en-US" sz="3300" b="0" i="0" kern="1200" dirty="0">
+              <a:rPr lang="en-US" sz="2400" b="0" i="0" kern="1200" dirty="0">
                 <a:solidFill>
                   <a:srgbClr val="EBEBEB"/>
                 </a:solidFill>
@@ -15677,7 +16926,7 @@
               <a:t>Necessary Equations</a:t>
             </a:r>
             <a:br>
-              <a:rPr lang="en-US" sz="3300" b="0" i="0" kern="1200" dirty="0">
+              <a:rPr lang="en-US" sz="2400" b="0" i="0" kern="1200" dirty="0">
                 <a:solidFill>
                   <a:srgbClr val="EBEBEB"/>
                 </a:solidFill>
@@ -15685,7 +16934,7 @@
                 <a:ea typeface="Cambria Math" panose="02040503050406030204" pitchFamily="18" charset="0"/>
               </a:rPr>
             </a:br>
-            <a:endParaRPr lang="en-US" sz="3300" b="0" i="0" kern="1200" dirty="0">
+            <a:endParaRPr lang="en-US" sz="2400" b="0" i="0" kern="1200" dirty="0">
               <a:solidFill>
                 <a:srgbClr val="EBEBEB"/>
               </a:solidFill>
@@ -15947,8 +17196,8 @@
           </a:p>
         </p:txBody>
       </p:sp>
-      <mc:AlternateContent xmlns:mc="http://schemas.openxmlformats.org/markup-compatibility/2006" xmlns:a14="http://schemas.microsoft.com/office/drawing/2010/main">
-        <mc:Choice Requires="a14">
+      <mc:AlternateContent xmlns:mc="http://schemas.openxmlformats.org/markup-compatibility/2006">
+        <mc:Choice xmlns:a14="http://schemas.microsoft.com/office/drawing/2010/main" Requires="a14">
           <p:sp>
             <p:nvSpPr>
               <p:cNvPr id="4" name="Content Placeholder 3">
@@ -15967,8 +17216,8 @@
             </p:nvSpPr>
             <p:spPr>
               <a:xfrm>
-                <a:off x="605860" y="1408711"/>
-                <a:ext cx="4280176" cy="4965352"/>
+                <a:off x="477307" y="1397348"/>
+                <a:ext cx="4615700" cy="4965352"/>
               </a:xfrm>
             </p:spPr>
             <p:txBody>
@@ -15977,252 +17226,9 @@
               </a:bodyPr>
               <a:lstStyle/>
               <a:p>
-                <a:r>
-                  <a:rPr lang="en-US" dirty="0">
-                    <a:solidFill>
-                      <a:srgbClr val="FFFFFF"/>
-                    </a:solidFill>
-                    <a:latin typeface="Cambria Math" panose="02040503050406030204" pitchFamily="18" charset="0"/>
-                    <a:ea typeface="Cambria Math" panose="02040503050406030204" pitchFamily="18" charset="0"/>
-                  </a:rPr>
-                  <a:t>Want to fit tail to the ODE:</a:t>
-                </a:r>
-              </a:p>
-              <a:p>
-                <a:pPr marL="0" indent="0" algn="ctr">
+                <a:pPr marL="0" indent="0">
                   <a:buNone/>
                 </a:pPr>
-                <a14:m>
-                  <m:oMath xmlns:m="http://schemas.openxmlformats.org/officeDocument/2006/math">
-                    <m:acc>
-                      <m:accPr>
-                        <m:chr m:val="̈"/>
-                        <m:ctrlPr>
-                          <a:rPr lang="en-US" i="1">
-                            <a:solidFill>
-                              <a:srgbClr val="FFFFFF"/>
-                            </a:solidFill>
-                            <a:latin typeface="Cambria Math" panose="02040503050406030204" pitchFamily="18" charset="0"/>
-                            <a:ea typeface="Cambria Math" panose="02040503050406030204" pitchFamily="18" charset="0"/>
-                          </a:rPr>
-                        </m:ctrlPr>
-                      </m:accPr>
-                      <m:e>
-                        <m:r>
-                          <m:rPr>
-                            <m:sty m:val="p"/>
-                          </m:rPr>
-                          <a:rPr lang="en-US">
-                            <a:solidFill>
-                              <a:srgbClr val="FFFFFF"/>
-                            </a:solidFill>
-                            <a:latin typeface="Cambria Math" panose="02040503050406030204" pitchFamily="18" charset="0"/>
-                            <a:ea typeface="Cambria Math" panose="02040503050406030204" pitchFamily="18" charset="0"/>
-                          </a:rPr>
-                          <m:t>ϕ</m:t>
-                        </m:r>
-                      </m:e>
-                    </m:acc>
-                    <m:r>
-                      <a:rPr lang="en-US">
-                        <a:solidFill>
-                          <a:srgbClr val="FFFFFF"/>
-                        </a:solidFill>
-                        <a:latin typeface="Cambria Math" panose="02040503050406030204" pitchFamily="18" charset="0"/>
-                        <a:ea typeface="Cambria Math" panose="02040503050406030204" pitchFamily="18" charset="0"/>
-                      </a:rPr>
-                      <m:t>  + 2</m:t>
-                    </m:r>
-                    <m:r>
-                      <m:rPr>
-                        <m:sty m:val="p"/>
-                      </m:rPr>
-                      <a:rPr lang="en-US" smtClean="0">
-                        <a:solidFill>
-                          <a:srgbClr val="FFFFFF"/>
-                        </a:solidFill>
-                        <a:latin typeface="Cambria Math" panose="02040503050406030204" pitchFamily="18" charset="0"/>
-                        <a:ea typeface="Cambria Math" panose="02040503050406030204" pitchFamily="18" charset="0"/>
-                      </a:rPr>
-                      <m:t>γ</m:t>
-                    </m:r>
-                    <m:acc>
-                      <m:accPr>
-                        <m:chr m:val="̇"/>
-                        <m:ctrlPr>
-                          <a:rPr lang="en-US" i="1">
-                            <a:solidFill>
-                              <a:srgbClr val="FFFFFF"/>
-                            </a:solidFill>
-                            <a:latin typeface="Cambria Math" panose="02040503050406030204" pitchFamily="18" charset="0"/>
-                            <a:ea typeface="Cambria Math" panose="02040503050406030204" pitchFamily="18" charset="0"/>
-                          </a:rPr>
-                        </m:ctrlPr>
-                      </m:accPr>
-                      <m:e>
-                        <m:r>
-                          <m:rPr>
-                            <m:sty m:val="p"/>
-                          </m:rPr>
-                          <a:rPr lang="en-US">
-                            <a:solidFill>
-                              <a:srgbClr val="FFFFFF"/>
-                            </a:solidFill>
-                            <a:latin typeface="Cambria Math" panose="02040503050406030204" pitchFamily="18" charset="0"/>
-                            <a:ea typeface="Cambria Math" panose="02040503050406030204" pitchFamily="18" charset="0"/>
-                          </a:rPr>
-                          <m:t>ϕ</m:t>
-                        </m:r>
-                      </m:e>
-                    </m:acc>
-                    <m:r>
-                      <a:rPr lang="en-US">
-                        <a:solidFill>
-                          <a:srgbClr val="FFFFFF"/>
-                        </a:solidFill>
-                        <a:latin typeface="Cambria Math" panose="02040503050406030204" pitchFamily="18" charset="0"/>
-                        <a:ea typeface="Cambria Math" panose="02040503050406030204" pitchFamily="18" charset="0"/>
-                      </a:rPr>
-                      <m:t> + </m:t>
-                    </m:r>
-                    <m:sSup>
-                      <m:sSupPr>
-                        <m:ctrlPr>
-                          <a:rPr lang="en-US" i="1">
-                            <a:solidFill>
-                              <a:srgbClr val="FFFFFF"/>
-                            </a:solidFill>
-                            <a:latin typeface="Cambria Math" panose="02040503050406030204" pitchFamily="18" charset="0"/>
-                            <a:ea typeface="Cambria Math" panose="02040503050406030204" pitchFamily="18" charset="0"/>
-                          </a:rPr>
-                        </m:ctrlPr>
-                      </m:sSupPr>
-                      <m:e>
-                        <m:r>
-                          <m:rPr>
-                            <m:sty m:val="p"/>
-                          </m:rPr>
-                          <a:rPr lang="en-US">
-                            <a:solidFill>
-                              <a:srgbClr val="FFFFFF"/>
-                            </a:solidFill>
-                            <a:latin typeface="Cambria Math" panose="02040503050406030204" pitchFamily="18" charset="0"/>
-                            <a:ea typeface="Cambria Math" panose="02040503050406030204" pitchFamily="18" charset="0"/>
-                          </a:rPr>
-                          <m:t>ω</m:t>
-                        </m:r>
-                      </m:e>
-                      <m:sup>
-                        <m:r>
-                          <a:rPr lang="en-US">
-                            <a:solidFill>
-                              <a:srgbClr val="FFFFFF"/>
-                            </a:solidFill>
-                            <a:latin typeface="Cambria Math" panose="02040503050406030204" pitchFamily="18" charset="0"/>
-                            <a:ea typeface="Cambria Math" panose="02040503050406030204" pitchFamily="18" charset="0"/>
-                          </a:rPr>
-                          <m:t>2</m:t>
-                        </m:r>
-                      </m:sup>
-                    </m:sSup>
-                    <m:r>
-                      <m:rPr>
-                        <m:sty m:val="p"/>
-                      </m:rPr>
-                      <a:rPr lang="en-US">
-                        <a:solidFill>
-                          <a:srgbClr val="FFFFFF"/>
-                        </a:solidFill>
-                        <a:latin typeface="Cambria Math" panose="02040503050406030204" pitchFamily="18" charset="0"/>
-                        <a:ea typeface="Cambria Math" panose="02040503050406030204" pitchFamily="18" charset="0"/>
-                      </a:rPr>
-                      <m:t>ϕ</m:t>
-                    </m:r>
-                    <m:r>
-                      <a:rPr lang="en-US">
-                        <a:solidFill>
-                          <a:srgbClr val="FFFFFF"/>
-                        </a:solidFill>
-                        <a:latin typeface="Cambria Math" panose="02040503050406030204" pitchFamily="18" charset="0"/>
-                        <a:ea typeface="Cambria Math" panose="02040503050406030204" pitchFamily="18" charset="0"/>
-                      </a:rPr>
-                      <m:t> = 0</m:t>
-                    </m:r>
-                  </m:oMath>
-                </a14:m>
-                <a:r>
-                  <a:rPr lang="en-US" dirty="0">
-                    <a:solidFill>
-                      <a:srgbClr val="FFFFFF"/>
-                    </a:solidFill>
-                    <a:latin typeface="Cambria Math" panose="02040503050406030204" pitchFamily="18" charset="0"/>
-                    <a:ea typeface="Cambria Math" panose="02040503050406030204" pitchFamily="18" charset="0"/>
-                  </a:rPr>
-                  <a:t>.	(1)</a:t>
-                </a:r>
-              </a:p>
-              <a:p>
-                <a:pPr lvl="1"/>
-                <a:r>
-                  <a:rPr lang="en-US" i="1" dirty="0">
-                    <a:solidFill>
-                      <a:schemeClr val="tx2"/>
-                    </a:solidFill>
-                    <a:latin typeface="Cambria Math" panose="02040503050406030204" pitchFamily="18" charset="0"/>
-                    <a:ea typeface="Cambria Math" panose="02040503050406030204" pitchFamily="18" charset="0"/>
-                  </a:rPr>
-                  <a:t>Overall goal is to solve for  </a:t>
-                </a:r>
-                <a14:m>
-                  <m:oMath xmlns:m="http://schemas.openxmlformats.org/officeDocument/2006/math">
-                    <m:r>
-                      <a:rPr lang="en-US" i="1">
-                        <a:solidFill>
-                          <a:schemeClr val="tx2"/>
-                        </a:solidFill>
-                        <a:latin typeface="Cambria Math" panose="02040503050406030204" pitchFamily="18" charset="0"/>
-                        <a:ea typeface="Cambria Math" panose="02040503050406030204" pitchFamily="18" charset="0"/>
-                      </a:rPr>
-                      <m:t>𝛾</m:t>
-                    </m:r>
-                  </m:oMath>
-                </a14:m>
-                <a:r>
-                  <a:rPr lang="en-US" i="1" dirty="0">
-                    <a:solidFill>
-                      <a:schemeClr val="tx2"/>
-                    </a:solidFill>
-                    <a:latin typeface="Cambria Math" panose="02040503050406030204" pitchFamily="18" charset="0"/>
-                    <a:ea typeface="Cambria Math" panose="02040503050406030204" pitchFamily="18" charset="0"/>
-                  </a:rPr>
-                  <a:t> and </a:t>
-                </a:r>
-                <a14:m>
-                  <m:oMath xmlns:m="http://schemas.openxmlformats.org/officeDocument/2006/math">
-                    <m:r>
-                      <a:rPr lang="en-US" b="0" i="1" smtClean="0">
-                        <a:solidFill>
-                          <a:schemeClr val="tx2"/>
-                        </a:solidFill>
-                        <a:latin typeface="Cambria Math" panose="02040503050406030204" pitchFamily="18" charset="0"/>
-                        <a:ea typeface="Cambria Math" panose="02040503050406030204" pitchFamily="18" charset="0"/>
-                      </a:rPr>
-                      <m:t>𝜔</m:t>
-                    </m:r>
-                  </m:oMath>
-                </a14:m>
-                <a:r>
-                  <a:rPr lang="en-US" i="1" dirty="0">
-                    <a:solidFill>
-                      <a:schemeClr val="tx2"/>
-                    </a:solidFill>
-                    <a:latin typeface="Cambria Math" panose="02040503050406030204" pitchFamily="18" charset="0"/>
-                    <a:ea typeface="Cambria Math" panose="02040503050406030204" pitchFamily="18" charset="0"/>
-                  </a:rPr>
-                  <a:t>.</a:t>
-                </a:r>
-              </a:p>
-              <a:p>
                 <a:endParaRPr lang="en-US" i="1" dirty="0">
                   <a:solidFill>
                     <a:schemeClr val="tx2"/>
@@ -16233,7 +17239,7 @@
               </a:p>
               <a:p>
                 <a:r>
-                  <a:rPr lang="en-US" dirty="0">
+                  <a:rPr lang="en-US" sz="2000" dirty="0">
                     <a:solidFill>
                       <a:srgbClr val="FFFFFF"/>
                     </a:solidFill>
@@ -16253,7 +17259,7 @@
                       <m:rPr>
                         <m:sty m:val="p"/>
                       </m:rPr>
-                      <a:rPr lang="en-US">
+                      <a:rPr lang="en-US" sz="2000">
                         <a:solidFill>
                           <a:srgbClr val="FFFFFF"/>
                         </a:solidFill>
@@ -16265,7 +17271,7 @@
                     <m:d>
                       <m:dPr>
                         <m:ctrlPr>
-                          <a:rPr lang="en-US" i="1">
+                          <a:rPr lang="en-US" sz="2000" i="1">
                             <a:solidFill>
                               <a:srgbClr val="FFFFFF"/>
                             </a:solidFill>
@@ -16276,7 +17282,7 @@
                       </m:dPr>
                       <m:e>
                         <m:r>
-                          <a:rPr lang="en-US">
+                          <a:rPr lang="en-US" sz="2000">
                             <a:solidFill>
                               <a:srgbClr val="FFFFFF"/>
                             </a:solidFill>
@@ -16288,7 +17294,7 @@
                       </m:e>
                     </m:d>
                     <m:r>
-                      <a:rPr lang="en-US">
+                      <a:rPr lang="en-US" sz="2000">
                         <a:solidFill>
                           <a:srgbClr val="FFFFFF"/>
                         </a:solidFill>
@@ -16300,7 +17306,7 @@
                     <m:sSup>
                       <m:sSupPr>
                         <m:ctrlPr>
-                          <a:rPr lang="en-US" i="1">
+                          <a:rPr lang="en-US" sz="2000" i="1">
                             <a:solidFill>
                               <a:srgbClr val="FFFFFF"/>
                             </a:solidFill>
@@ -16311,7 +17317,7 @@
                       </m:sSupPr>
                       <m:e>
                         <m:r>
-                          <a:rPr lang="en-US">
+                          <a:rPr lang="en-US" sz="2000">
                             <a:solidFill>
                               <a:srgbClr val="FFFFFF"/>
                             </a:solidFill>
@@ -16323,7 +17329,7 @@
                       </m:e>
                       <m:sup>
                         <m:r>
-                          <a:rPr lang="en-US">
+                          <a:rPr lang="en-US" sz="2000">
                             <a:solidFill>
                               <a:srgbClr val="FFFFFF"/>
                             </a:solidFill>
@@ -16336,7 +17342,7 @@
                           <m:rPr>
                             <m:sty m:val="p"/>
                           </m:rPr>
-                          <a:rPr lang="en-US">
+                          <a:rPr lang="en-US" sz="2000">
                             <a:solidFill>
                               <a:srgbClr val="FFFFFF"/>
                             </a:solidFill>
@@ -16346,7 +17352,7 @@
                           <m:t>γ</m:t>
                         </m:r>
                         <m:r>
-                          <a:rPr lang="en-US">
+                          <a:rPr lang="en-US" sz="2000">
                             <a:solidFill>
                               <a:srgbClr val="FFFFFF"/>
                             </a:solidFill>
@@ -16362,7 +17368,7 @@
                         <m:begChr m:val="["/>
                         <m:endChr m:val="]"/>
                         <m:ctrlPr>
-                          <a:rPr lang="en-US" i="1">
+                          <a:rPr lang="en-US" sz="2000" i="1">
                             <a:solidFill>
                               <a:srgbClr val="FFFFFF"/>
                             </a:solidFill>
@@ -16375,7 +17381,7 @@
                         <m:sSub>
                           <m:sSubPr>
                             <m:ctrlPr>
-                              <a:rPr lang="en-US" i="1">
+                              <a:rPr lang="en-US" sz="2000" i="1">
                                 <a:solidFill>
                                   <a:srgbClr val="FFFFFF"/>
                                 </a:solidFill>
@@ -16389,7 +17395,7 @@
                               <m:rPr>
                                 <m:sty m:val="p"/>
                               </m:rPr>
-                              <a:rPr lang="en-US">
+                              <a:rPr lang="en-US" sz="2000">
                                 <a:solidFill>
                                   <a:srgbClr val="FFFFFF"/>
                                 </a:solidFill>
@@ -16401,7 +17407,7 @@
                           </m:e>
                           <m:sub>
                             <m:r>
-                              <a:rPr lang="en-US">
+                              <a:rPr lang="en-US" sz="2000">
                                 <a:solidFill>
                                   <a:srgbClr val="FFFFFF"/>
                                 </a:solidFill>
@@ -16413,7 +17419,7 @@
                           </m:sub>
                         </m:sSub>
                         <m:r>
-                          <a:rPr lang="en-US">
+                          <a:rPr lang="en-US" sz="2000">
                             <a:solidFill>
                               <a:srgbClr val="FFFFFF"/>
                             </a:solidFill>
@@ -16425,7 +17431,7 @@
                         <m:d>
                           <m:dPr>
                             <m:ctrlPr>
-                              <a:rPr lang="en-US" i="1">
+                              <a:rPr lang="en-US" sz="2000" i="1">
                                 <a:solidFill>
                                   <a:srgbClr val="FFFFFF"/>
                                 </a:solidFill>
@@ -16439,7 +17445,7 @@
                               <m:rPr>
                                 <m:sty m:val="p"/>
                               </m:rPr>
-                              <a:rPr lang="en-US">
+                              <a:rPr lang="en-US" sz="2000">
                                 <a:solidFill>
                                   <a:srgbClr val="FFFFFF"/>
                                 </a:solidFill>
@@ -16449,7 +17455,7 @@
                               <m:t>Ω</m:t>
                             </m:r>
                             <m:r>
-                              <a:rPr lang="en-US">
+                              <a:rPr lang="en-US" sz="2000">
                                 <a:solidFill>
                                   <a:srgbClr val="FFFFFF"/>
                                 </a:solidFill>
@@ -16461,7 +17467,7 @@
                           </m:e>
                         </m:d>
                         <m:r>
-                          <a:rPr lang="en-US">
+                          <a:rPr lang="en-US" sz="2000">
                             <a:solidFill>
                               <a:srgbClr val="FFFFFF"/>
                             </a:solidFill>
@@ -16473,7 +17479,7 @@
                         <m:sSub>
                           <m:sSubPr>
                             <m:ctrlPr>
-                              <a:rPr lang="en-US" i="1">
+                              <a:rPr lang="en-US" sz="2000" i="1">
                                 <a:solidFill>
                                   <a:srgbClr val="FFFFFF"/>
                                 </a:solidFill>
@@ -16487,7 +17493,7 @@
                               <m:rPr>
                                 <m:sty m:val="p"/>
                               </m:rPr>
-                              <a:rPr lang="en-US">
+                              <a:rPr lang="en-US" sz="2000">
                                 <a:solidFill>
                                   <a:srgbClr val="FFFFFF"/>
                                 </a:solidFill>
@@ -16499,7 +17505,7 @@
                           </m:e>
                           <m:sub>
                             <m:r>
-                              <a:rPr lang="en-US">
+                              <a:rPr lang="en-US" sz="2000">
                                 <a:solidFill>
                                   <a:srgbClr val="FFFFFF"/>
                                 </a:solidFill>
@@ -16511,7 +17517,7 @@
                           </m:sub>
                         </m:sSub>
                         <m:r>
-                          <a:rPr lang="en-US">
+                          <a:rPr lang="en-US" sz="2000">
                             <a:solidFill>
                               <a:srgbClr val="FFFFFF"/>
                             </a:solidFill>
@@ -16523,7 +17529,7 @@
                         <m:d>
                           <m:dPr>
                             <m:ctrlPr>
-                              <a:rPr lang="en-US" i="1">
+                              <a:rPr lang="en-US" sz="2000" i="1">
                                 <a:solidFill>
                                   <a:srgbClr val="FFFFFF"/>
                                 </a:solidFill>
@@ -16537,7 +17543,7 @@
                               <m:rPr>
                                 <m:sty m:val="p"/>
                               </m:rPr>
-                              <a:rPr lang="en-US">
+                              <a:rPr lang="en-US" sz="2000">
                                 <a:solidFill>
                                   <a:srgbClr val="FFFFFF"/>
                                 </a:solidFill>
@@ -16547,7 +17553,7 @@
                               <m:t>Ω</m:t>
                             </m:r>
                             <m:r>
-                              <a:rPr lang="en-US">
+                              <a:rPr lang="en-US" sz="2000">
                                 <a:solidFill>
                                   <a:srgbClr val="FFFFFF"/>
                                 </a:solidFill>
@@ -16560,20 +17566,10 @@
                         </m:d>
                       </m:e>
                     </m:d>
-                    <m:r>
-                      <a:rPr lang="en-US" b="0" i="0" smtClean="0">
-                        <a:solidFill>
-                          <a:srgbClr val="FFFFFF"/>
-                        </a:solidFill>
-                        <a:latin typeface="Cambria Math" panose="02040503050406030204" pitchFamily="18" charset="0"/>
-                        <a:ea typeface="Cambria Math" panose="02040503050406030204" pitchFamily="18" charset="0"/>
-                      </a:rPr>
-                      <m:t>,</m:t>
-                    </m:r>
                   </m:oMath>
                 </a14:m>
                 <a:r>
-                  <a:rPr lang="en-US" dirty="0">
+                  <a:rPr lang="en-US" sz="2000" dirty="0">
                     <a:solidFill>
                       <a:srgbClr val="FFFFFF"/>
                     </a:solidFill>
@@ -16588,7 +17584,7 @@
                   <a:buNone/>
                 </a:pPr>
                 <a:r>
-                  <a:rPr lang="en-US" dirty="0">
+                  <a:rPr lang="en-US" sz="2000" dirty="0">
                     <a:solidFill>
                       <a:srgbClr val="FFFFFF"/>
                     </a:solidFill>
@@ -16603,7 +17599,7 @@
                       <m:rPr>
                         <m:sty m:val="p"/>
                       </m:rPr>
-                      <a:rPr lang="en-US" b="0" i="0" smtClean="0">
+                      <a:rPr lang="en-US" sz="2000" b="0" i="0" smtClean="0">
                         <a:solidFill>
                           <a:srgbClr val="FFFFFF"/>
                         </a:solidFill>
@@ -16613,7 +17609,7 @@
                       <m:t>Ω</m:t>
                     </m:r>
                     <m:r>
-                      <a:rPr lang="en-US" b="0" i="1" smtClean="0">
+                      <a:rPr lang="en-US" sz="2000" b="0" i="1" smtClean="0">
                         <a:solidFill>
                           <a:srgbClr val="FFFFFF"/>
                         </a:solidFill>
@@ -16626,7 +17622,7 @@
                       <m:radPr>
                         <m:degHide m:val="on"/>
                         <m:ctrlPr>
-                          <a:rPr lang="en-US" b="0" i="1" smtClean="0">
+                          <a:rPr lang="en-US" sz="2000" b="0" i="1" smtClean="0">
                             <a:solidFill>
                               <a:srgbClr val="FFFFFF"/>
                             </a:solidFill>
@@ -16640,7 +17636,7 @@
                         <m:sSup>
                           <m:sSupPr>
                             <m:ctrlPr>
-                              <a:rPr lang="en-US" b="0" i="1" smtClean="0">
+                              <a:rPr lang="en-US" sz="2000" b="0" i="1" smtClean="0">
                                 <a:solidFill>
                                   <a:srgbClr val="FFFFFF"/>
                                 </a:solidFill>
@@ -16654,7 +17650,7 @@
                               <m:rPr>
                                 <m:sty m:val="p"/>
                               </m:rPr>
-                              <a:rPr lang="en-US" b="0" i="1" smtClean="0">
+                              <a:rPr lang="en-US" sz="2000" b="0" i="1" smtClean="0">
                                 <a:solidFill>
                                   <a:srgbClr val="FFFFFF"/>
                                 </a:solidFill>
@@ -16666,7 +17662,7 @@
                           </m:e>
                           <m:sup>
                             <m:r>
-                              <a:rPr lang="en-US" b="0" i="1" smtClean="0">
+                              <a:rPr lang="en-US" sz="2000" b="0" i="1" smtClean="0">
                                 <a:solidFill>
                                   <a:srgbClr val="FFFFFF"/>
                                 </a:solidFill>
@@ -16678,7 +17674,7 @@
                           </m:sup>
                         </m:sSup>
                         <m:r>
-                          <a:rPr lang="en-US" b="0" i="1" smtClean="0">
+                          <a:rPr lang="en-US" sz="2000" b="0" i="1" smtClean="0">
                             <a:solidFill>
                               <a:srgbClr val="FFFFFF"/>
                             </a:solidFill>
@@ -16690,7 +17686,7 @@
                         <m:sSup>
                           <m:sSupPr>
                             <m:ctrlPr>
-                              <a:rPr lang="en-US" b="0" i="1" smtClean="0">
+                              <a:rPr lang="en-US" sz="2000" b="0" i="1" smtClean="0">
                                 <a:solidFill>
                                   <a:srgbClr val="FFFFFF"/>
                                 </a:solidFill>
@@ -16704,7 +17700,7 @@
                               <m:rPr>
                                 <m:sty m:val="p"/>
                               </m:rPr>
-                              <a:rPr lang="en-US" b="0" i="1" smtClean="0">
+                              <a:rPr lang="en-US" sz="2000" b="0" i="1" smtClean="0">
                                 <a:solidFill>
                                   <a:srgbClr val="FFFFFF"/>
                                 </a:solidFill>
@@ -16716,7 +17712,7 @@
                           </m:e>
                           <m:sup>
                             <m:r>
-                              <a:rPr lang="en-US" b="0" i="1" smtClean="0">
+                              <a:rPr lang="en-US" sz="2000" b="0" i="1" smtClean="0">
                                 <a:solidFill>
                                   <a:srgbClr val="FFFFFF"/>
                                 </a:solidFill>
@@ -16732,7 +17728,7 @@
                   </m:oMath>
                 </a14:m>
                 <a:r>
-                  <a:rPr lang="en-US" b="0" dirty="0">
+                  <a:rPr lang="en-US" sz="2000" b="0" dirty="0">
                     <a:solidFill>
                       <a:srgbClr val="FFFFFF"/>
                     </a:solidFill>
@@ -16746,7 +17742,7 @@
                     <m:sSub>
                       <m:sSubPr>
                         <m:ctrlPr>
-                          <a:rPr lang="en-US" i="1">
+                          <a:rPr lang="en-US" sz="2000" i="1">
                             <a:solidFill>
                               <a:srgbClr val="FFFFFF"/>
                             </a:solidFill>
@@ -16760,7 +17756,7 @@
                           <m:rPr>
                             <m:sty m:val="p"/>
                           </m:rPr>
-                          <a:rPr lang="en-US">
+                          <a:rPr lang="en-US" sz="2000">
                             <a:solidFill>
                               <a:srgbClr val="FFFFFF"/>
                             </a:solidFill>
@@ -16772,7 +17768,7 @@
                       </m:e>
                       <m:sub>
                         <m:r>
-                          <a:rPr lang="en-US">
+                          <a:rPr lang="en-US" sz="2000">
                             <a:solidFill>
                               <a:srgbClr val="FFFFFF"/>
                             </a:solidFill>
@@ -16784,7 +17780,7 @@
                       </m:sub>
                     </m:sSub>
                     <m:r>
-                      <a:rPr lang="en-US" b="0" i="1" smtClean="0">
+                      <a:rPr lang="en-US" sz="2000" b="0" i="1" smtClean="0">
                         <a:solidFill>
                           <a:srgbClr val="FFFFFF"/>
                         </a:solidFill>
@@ -16796,7 +17792,7 @@
                     <m:sSub>
                       <m:sSubPr>
                         <m:ctrlPr>
-                          <a:rPr lang="en-US" i="1">
+                          <a:rPr lang="en-US" sz="2000" i="1">
                             <a:solidFill>
                               <a:srgbClr val="FFFFFF"/>
                             </a:solidFill>
@@ -16810,7 +17806,7 @@
                           <m:rPr>
                             <m:sty m:val="p"/>
                           </m:rPr>
-                          <a:rPr lang="en-US">
+                          <a:rPr lang="en-US" sz="2000">
                             <a:solidFill>
                               <a:srgbClr val="FFFFFF"/>
                             </a:solidFill>
@@ -16822,7 +17818,7 @@
                       </m:e>
                       <m:sub>
                         <m:r>
-                          <a:rPr lang="en-US" b="0" i="0" smtClean="0">
+                          <a:rPr lang="en-US" sz="2000" b="0" i="0" smtClean="0">
                             <a:solidFill>
                               <a:srgbClr val="FFFFFF"/>
                             </a:solidFill>
@@ -16836,7 +17832,7 @@
                   </m:oMath>
                 </a14:m>
                 <a:r>
-                  <a:rPr lang="en-US" b="0" dirty="0">
+                  <a:rPr lang="en-US" sz="2000" b="0" dirty="0">
                     <a:solidFill>
                       <a:srgbClr val="FFFFFF"/>
                     </a:solidFill>
@@ -16850,7 +17846,7 @@
                 <a:pPr marL="0" indent="0">
                   <a:buNone/>
                 </a:pPr>
-                <a:endParaRPr lang="en-US" b="0" dirty="0">
+                <a:endParaRPr lang="en-US" sz="2000" b="0" dirty="0">
                   <a:solidFill>
                     <a:srgbClr val="FFFFFF"/>
                   </a:solidFill>
@@ -16860,7 +17856,7 @@
               </a:p>
               <a:p>
                 <a:r>
-                  <a:rPr lang="en-US" dirty="0">
+                  <a:rPr lang="en-US" sz="2000" dirty="0">
                     <a:solidFill>
                       <a:srgbClr val="FFFFFF"/>
                     </a:solidFill>
@@ -16875,7 +17871,7 @@
                       <m:rPr>
                         <m:sty m:val="p"/>
                       </m:rPr>
-                      <a:rPr lang="en-US" b="0" i="1" smtClean="0">
+                      <a:rPr lang="en-US" sz="2000" b="0" i="1" smtClean="0">
                         <a:solidFill>
                           <a:srgbClr val="FFFFFF"/>
                         </a:solidFill>
@@ -16885,7 +17881,7 @@
                       <m:t>ϕ</m:t>
                     </m:r>
                     <m:r>
-                      <a:rPr lang="en-US" b="0" i="1" smtClean="0">
+                      <a:rPr lang="en-US" sz="2000" b="0" i="1" smtClean="0">
                         <a:solidFill>
                           <a:srgbClr val="FFFFFF"/>
                         </a:solidFill>
@@ -16898,7 +17894,7 @@
                       <m:rPr>
                         <m:sty m:val="p"/>
                       </m:rPr>
-                      <a:rPr lang="en-US" b="0" i="1" smtClean="0">
+                      <a:rPr lang="en-US" sz="2000" b="0" i="1" smtClean="0">
                         <a:solidFill>
                           <a:srgbClr val="FFFFFF"/>
                         </a:solidFill>
@@ -16908,7 +17904,7 @@
                       <m:t>t</m:t>
                     </m:r>
                     <m:r>
-                      <a:rPr lang="en-US" b="0" i="1" smtClean="0">
+                      <a:rPr lang="en-US" sz="2000" b="0" i="1" smtClean="0">
                         <a:solidFill>
                           <a:srgbClr val="FFFFFF"/>
                         </a:solidFill>
@@ -16920,7 +17916,7 @@
                   </m:oMath>
                 </a14:m>
                 <a:r>
-                  <a:rPr lang="en-US" b="0" dirty="0">
+                  <a:rPr lang="en-US" sz="2000" b="0" dirty="0">
                     <a:solidFill>
                       <a:srgbClr val="FFFFFF"/>
                     </a:solidFill>
@@ -16930,7 +17926,7 @@
                   <a:t> </a:t>
                 </a:r>
                 <a:r>
-                  <a:rPr lang="en-US" b="0" dirty="0" err="1">
+                  <a:rPr lang="en-US" sz="2000" b="0" dirty="0" err="1">
                     <a:solidFill>
                       <a:srgbClr val="FFFFFF"/>
                     </a:solidFill>
@@ -16940,7 +17936,7 @@
                   <a:t>s</a:t>
                 </a:r>
                 <a:r>
-                  <a:rPr lang="en-US" b="0" dirty="0">
+                  <a:rPr lang="en-US" sz="2000" b="0" dirty="0">
                     <a:solidFill>
                       <a:srgbClr val="FFFFFF"/>
                     </a:solidFill>
@@ -16955,7 +17951,7 @@
                       <m:accPr>
                         <m:chr m:val="̇"/>
                         <m:ctrlPr>
-                          <a:rPr lang="en-US" i="1">
+                          <a:rPr lang="en-US" sz="2000" i="1">
                             <a:solidFill>
                               <a:srgbClr val="FFFFFF"/>
                             </a:solidFill>
@@ -16969,7 +17965,7 @@
                           <m:rPr>
                             <m:sty m:val="p"/>
                           </m:rPr>
-                          <a:rPr lang="en-US">
+                          <a:rPr lang="en-US" sz="2000">
                             <a:solidFill>
                               <a:srgbClr val="FFFFFF"/>
                             </a:solidFill>
@@ -16981,7 +17977,7 @@
                       </m:e>
                     </m:acc>
                     <m:r>
-                      <a:rPr lang="en-US" i="1">
+                      <a:rPr lang="en-US" sz="2000" i="1">
                         <a:solidFill>
                           <a:srgbClr val="FFFFFF"/>
                         </a:solidFill>
@@ -16994,7 +17990,7 @@
                       <m:rPr>
                         <m:sty m:val="p"/>
                       </m:rPr>
-                      <a:rPr lang="en-US" i="1">
+                      <a:rPr lang="en-US" sz="2000" i="1">
                         <a:solidFill>
                           <a:srgbClr val="FFFFFF"/>
                         </a:solidFill>
@@ -17004,7 +18000,7 @@
                       <m:t>t</m:t>
                     </m:r>
                     <m:r>
-                      <a:rPr lang="en-US" i="1">
+                      <a:rPr lang="en-US" sz="2000" i="1">
                         <a:solidFill>
                           <a:srgbClr val="FFFFFF"/>
                         </a:solidFill>
@@ -17016,7 +18012,7 @@
                   </m:oMath>
                 </a14:m>
                 <a:r>
-                  <a:rPr lang="en-US" dirty="0">
+                  <a:rPr lang="en-US" sz="2000" dirty="0">
                     <a:solidFill>
                       <a:srgbClr val="FFFFFF"/>
                     </a:solidFill>
@@ -17031,7 +18027,7 @@
                       <m:rPr>
                         <m:sty m:val="p"/>
                       </m:rPr>
-                      <a:rPr lang="en-US" b="0" i="1" smtClean="0">
+                      <a:rPr lang="en-US" sz="2000" b="0" i="1" smtClean="0">
                         <a:solidFill>
                           <a:srgbClr val="FFFFFF"/>
                         </a:solidFill>
@@ -17041,7 +18037,7 @@
                       <m:t>γ</m:t>
                     </m:r>
                     <m:r>
-                      <a:rPr lang="en-US" b="0" i="0" smtClean="0">
+                      <a:rPr lang="en-US" sz="2000" b="0" i="0" smtClean="0">
                         <a:solidFill>
                           <a:srgbClr val="FFFFFF"/>
                         </a:solidFill>
@@ -17054,7 +18050,7 @@
                       <m:rPr>
                         <m:sty m:val="p"/>
                       </m:rPr>
-                      <a:rPr lang="en-US" b="0" i="1" smtClean="0">
+                      <a:rPr lang="en-US" sz="2000" b="0" i="1" smtClean="0">
                         <a:solidFill>
                           <a:srgbClr val="FFFFFF"/>
                         </a:solidFill>
@@ -17066,7 +18062,7 @@
                   </m:oMath>
                 </a14:m>
                 <a:r>
-                  <a:rPr lang="en-US" b="0" dirty="0">
+                  <a:rPr lang="en-US" sz="2000" b="0" dirty="0">
                     <a:solidFill>
                       <a:srgbClr val="FFFFFF"/>
                     </a:solidFill>
@@ -17080,7 +18076,7 @@
                     <m:sSub>
                       <m:sSubPr>
                         <m:ctrlPr>
-                          <a:rPr lang="en-US" i="1">
+                          <a:rPr lang="en-US" sz="2000" i="1">
                             <a:solidFill>
                               <a:srgbClr val="FFFFFF"/>
                             </a:solidFill>
@@ -17094,7 +18090,7 @@
                           <m:rPr>
                             <m:sty m:val="p"/>
                           </m:rPr>
-                          <a:rPr lang="en-US">
+                          <a:rPr lang="en-US" sz="2000">
                             <a:solidFill>
                               <a:srgbClr val="FFFFFF"/>
                             </a:solidFill>
@@ -17106,7 +18102,7 @@
                       </m:e>
                       <m:sub>
                         <m:r>
-                          <a:rPr lang="en-US">
+                          <a:rPr lang="en-US" sz="2000">
                             <a:solidFill>
                               <a:srgbClr val="FFFFFF"/>
                             </a:solidFill>
@@ -17118,7 +18114,7 @@
                       </m:sub>
                     </m:sSub>
                     <m:r>
-                      <a:rPr lang="en-US" i="1">
+                      <a:rPr lang="en-US" sz="2000" i="1">
                         <a:solidFill>
                           <a:srgbClr val="FFFFFF"/>
                         </a:solidFill>
@@ -17130,7 +18126,7 @@
                     <m:sSub>
                       <m:sSubPr>
                         <m:ctrlPr>
-                          <a:rPr lang="en-US" i="1">
+                          <a:rPr lang="en-US" sz="2000" i="1">
                             <a:solidFill>
                               <a:srgbClr val="FFFFFF"/>
                             </a:solidFill>
@@ -17144,7 +18140,7 @@
                           <m:rPr>
                             <m:sty m:val="p"/>
                           </m:rPr>
-                          <a:rPr lang="en-US">
+                          <a:rPr lang="en-US" sz="2000">
                             <a:solidFill>
                               <a:srgbClr val="FFFFFF"/>
                             </a:solidFill>
@@ -17156,7 +18152,7 @@
                       </m:e>
                       <m:sub>
                         <m:r>
-                          <a:rPr lang="en-US">
+                          <a:rPr lang="en-US" sz="2000">
                             <a:solidFill>
                               <a:srgbClr val="FFFFFF"/>
                             </a:solidFill>
@@ -17170,7 +18166,7 @@
                   </m:oMath>
                 </a14:m>
                 <a:r>
-                  <a:rPr lang="en-US" dirty="0">
+                  <a:rPr lang="en-US" sz="2000" dirty="0">
                     <a:solidFill>
                       <a:srgbClr val="FFFFFF"/>
                     </a:solidFill>
@@ -17179,7 +18175,7 @@
                   </a:rPr>
                   <a:t>.</a:t>
                 </a:r>
-                <a:endParaRPr lang="en-US" b="0" dirty="0">
+                <a:endParaRPr lang="en-US" sz="2000" b="0" dirty="0">
                   <a:solidFill>
                     <a:srgbClr val="FFFFFF"/>
                   </a:solidFill>
@@ -17234,7 +18230,7 @@
             </p:txBody>
           </p:sp>
         </mc:Choice>
-        <mc:Fallback xmlns="">
+        <mc:Fallback>
           <p:sp>
             <p:nvSpPr>
               <p:cNvPr id="4" name="Content Placeholder 3">
@@ -17253,13 +18249,13 @@
             </p:nvSpPr>
             <p:spPr>
               <a:xfrm>
-                <a:off x="605860" y="1408711"/>
-                <a:ext cx="4280176" cy="4965352"/>
+                <a:off x="477307" y="1397348"/>
+                <a:ext cx="4615700" cy="4965352"/>
               </a:xfrm>
               <a:blipFill>
                 <a:blip r:embed="rId5"/>
                 <a:stretch>
-                  <a:fillRect l="-1183" t="-509" r="-592"/>
+                  <a:fillRect l="-1374" r="-1099"/>
                 </a:stretch>
               </a:blipFill>
             </p:spPr>
@@ -17646,7 +18642,7 @@
 </p:sld>
 </file>
 
-<file path=ppt/slides/slide3.xml><?xml version="1.0" encoding="utf-8"?>
+<file path=ppt/slides/slide4.xml><?xml version="1.0" encoding="utf-8"?>
 <p:sld xmlns:a="http://schemas.openxmlformats.org/drawingml/2006/main" xmlns:r="http://schemas.openxmlformats.org/officeDocument/2006/relationships" xmlns:p="http://schemas.openxmlformats.org/presentationml/2006/main">
   <p:cSld>
     <p:spTree>
@@ -19045,8 +20041,8 @@
           </p:sp>
         </mc:Fallback>
       </mc:AlternateContent>
-      <mc:AlternateContent xmlns:mc="http://schemas.openxmlformats.org/markup-compatibility/2006" xmlns:a14="http://schemas.microsoft.com/office/drawing/2010/main">
-        <mc:Choice Requires="a14">
+      <mc:AlternateContent xmlns:mc="http://schemas.openxmlformats.org/markup-compatibility/2006">
+        <mc:Choice xmlns:a14="http://schemas.microsoft.com/office/drawing/2010/main" Requires="a14">
           <p:sp>
             <p:nvSpPr>
               <p:cNvPr id="9" name="Content Placeholder 3">
@@ -19063,8 +20059,8 @@
             </p:nvSpPr>
             <p:spPr>
               <a:xfrm>
-                <a:off x="6289697" y="454865"/>
-                <a:ext cx="4280176" cy="6233318"/>
+                <a:off x="6289697" y="262468"/>
+                <a:ext cx="4280176" cy="6595532"/>
               </a:xfrm>
               <a:prstGeom prst="rect">
                 <a:avLst/>
@@ -19072,7 +20068,7 @@
             </p:spPr>
             <p:txBody>
               <a:bodyPr vert="horz" lIns="91440" tIns="45720" rIns="91440" bIns="45720" rtlCol="0">
-                <a:normAutofit lnSpcReduction="10000"/>
+                <a:normAutofit fontScale="92500"/>
               </a:bodyPr>
               <a:lstStyle>
                 <a:lvl1pPr marL="342900" indent="-342900" algn="l" defTabSz="457200" rtl="0" eaLnBrk="1" latinLnBrk="0" hangingPunct="1">
@@ -19306,9 +20302,9 @@
                   <a:buNone/>
                 </a:pPr>
                 <a:r>
-                  <a:rPr lang="en-US" dirty="0">
+                  <a:rPr lang="en-US" sz="2400" dirty="0">
                     <a:solidFill>
-                      <a:schemeClr val="tx1"/>
+                      <a:schemeClr val="accent1"/>
                     </a:solidFill>
                     <a:latin typeface="Cambria Math" panose="02040503050406030204" pitchFamily="18" charset="0"/>
                     <a:ea typeface="Cambria Math" panose="02040503050406030204" pitchFamily="18" charset="0"/>
@@ -19321,9 +20317,9 @@
                       <m:rPr>
                         <m:sty m:val="p"/>
                       </m:rPr>
-                      <a:rPr lang="en-US" i="1">
+                      <a:rPr lang="en-US" sz="2400" i="1">
                         <a:solidFill>
-                          <a:schemeClr val="tx1"/>
+                          <a:schemeClr val="accent1"/>
                         </a:solidFill>
                         <a:latin typeface="Cambria Math" panose="02040503050406030204" pitchFamily="18" charset="0"/>
                         <a:ea typeface="Cambria Math" panose="02040503050406030204" pitchFamily="18" charset="0"/>
@@ -19331,9 +20327,9 @@
                       <m:t>γ</m:t>
                     </m:r>
                     <m:r>
-                      <a:rPr lang="en-US" b="0" i="1" smtClean="0">
+                      <a:rPr lang="en-US" sz="2400" b="0" i="1" smtClean="0">
                         <a:solidFill>
-                          <a:schemeClr val="tx1"/>
+                          <a:schemeClr val="accent1"/>
                         </a:solidFill>
                         <a:latin typeface="Cambria Math" panose="02040503050406030204" pitchFamily="18" charset="0"/>
                         <a:ea typeface="Cambria Math" panose="02040503050406030204" pitchFamily="18" charset="0"/>
@@ -19344,9 +20340,9 @@
                       <m:rPr>
                         <m:sty m:val="p"/>
                       </m:rPr>
-                      <a:rPr lang="en-US" b="0" i="1" smtClean="0">
+                      <a:rPr lang="en-US" sz="2400" b="0" i="1" smtClean="0">
                         <a:solidFill>
-                          <a:schemeClr val="tx1"/>
+                          <a:schemeClr val="accent1"/>
                         </a:solidFill>
                         <a:latin typeface="Cambria Math" panose="02040503050406030204" pitchFamily="18" charset="0"/>
                         <a:ea typeface="Cambria Math" panose="02040503050406030204" pitchFamily="18" charset="0"/>
@@ -19355,9 +20351,9 @@
                     </m:r>
                   </m:oMath>
                 </a14:m>
-                <a:endParaRPr lang="en-US" dirty="0">
+                <a:endParaRPr lang="en-US" sz="2400" dirty="0">
                   <a:solidFill>
-                    <a:schemeClr val="tx1"/>
+                    <a:schemeClr val="accent1"/>
                   </a:solidFill>
                   <a:latin typeface="Cambria Math" panose="02040503050406030204" pitchFamily="18" charset="0"/>
                   <a:ea typeface="Cambria Math" panose="02040503050406030204" pitchFamily="18" charset="0"/>
@@ -19365,7 +20361,7 @@
               </a:p>
               <a:p>
                 <a:r>
-                  <a:rPr lang="en-US" dirty="0">
+                  <a:rPr lang="en-US" sz="2000" dirty="0">
                     <a:solidFill>
                       <a:schemeClr val="tx1"/>
                     </a:solidFill>
@@ -19386,7 +20382,7 @@
                     </m:oMathParaPr>
                     <m:oMath xmlns:m="http://schemas.openxmlformats.org/officeDocument/2006/math">
                       <m:r>
-                        <a:rPr lang="en-US" i="1" smtClean="0">
+                        <a:rPr lang="en-US" sz="2000" i="1" smtClean="0">
                           <a:solidFill>
                             <a:schemeClr val="tx1"/>
                           </a:solidFill>
@@ -19398,7 +20394,7 @@
                       <m:d>
                         <m:dPr>
                           <m:ctrlPr>
-                            <a:rPr lang="en-US" b="0" i="1" smtClean="0">
+                            <a:rPr lang="en-US" sz="2000" b="0" i="1" smtClean="0">
                               <a:solidFill>
                                 <a:schemeClr val="tx1"/>
                               </a:solidFill>
@@ -19409,7 +20405,7 @@
                         </m:dPr>
                         <m:e>
                           <m:r>
-                            <a:rPr lang="en-US" b="0" i="1" smtClean="0">
+                            <a:rPr lang="en-US" sz="2000" b="0" i="1" smtClean="0">
                               <a:solidFill>
                                 <a:schemeClr val="tx1"/>
                               </a:solidFill>
@@ -19421,7 +20417,7 @@
                         </m:e>
                       </m:d>
                       <m:r>
-                        <a:rPr lang="en-US" b="0" i="1" smtClean="0">
+                        <a:rPr lang="en-US" sz="2000" b="0" i="1" smtClean="0">
                           <a:solidFill>
                             <a:schemeClr val="tx1"/>
                           </a:solidFill>
@@ -19431,7 +20427,7 @@
                         <m:t>=</m:t>
                       </m:r>
                       <m:r>
-                        <a:rPr lang="en-US" b="0" i="1" smtClean="0">
+                        <a:rPr lang="en-US" sz="2000" b="0" i="1" smtClean="0">
                           <a:solidFill>
                             <a:schemeClr val="tx1"/>
                           </a:solidFill>
@@ -19443,7 +20439,7 @@
                       <m:d>
                         <m:dPr>
                           <m:ctrlPr>
-                            <a:rPr lang="en-US" b="0" i="1" smtClean="0">
+                            <a:rPr lang="en-US" sz="2000" b="0" i="1" smtClean="0">
                               <a:solidFill>
                                 <a:schemeClr val="tx1"/>
                               </a:solidFill>
@@ -19456,7 +20452,7 @@
                           <m:sSub>
                             <m:sSubPr>
                               <m:ctrlPr>
-                                <a:rPr lang="en-US" b="0" i="1" smtClean="0">
+                                <a:rPr lang="en-US" sz="2000" b="0" i="1" smtClean="0">
                                   <a:solidFill>
                                     <a:schemeClr val="tx1"/>
                                   </a:solidFill>
@@ -19467,7 +20463,7 @@
                             </m:sSubPr>
                             <m:e>
                               <m:r>
-                                <a:rPr lang="en-US" b="0" i="1" smtClean="0">
+                                <a:rPr lang="en-US" sz="2000" b="0" i="1" smtClean="0">
                                   <a:solidFill>
                                     <a:schemeClr val="tx1"/>
                                   </a:solidFill>
@@ -19479,7 +20475,7 @@
                             </m:e>
                             <m:sub>
                               <m:r>
-                                <a:rPr lang="en-US" b="0" i="1" smtClean="0">
+                                <a:rPr lang="en-US" sz="2000" b="0" i="1" smtClean="0">
                                   <a:solidFill>
                                     <a:schemeClr val="tx1"/>
                                   </a:solidFill>
@@ -19495,7 +20491,7 @@
                       <m:sSup>
                         <m:sSupPr>
                           <m:ctrlPr>
-                            <a:rPr lang="en-US" b="0" i="1" smtClean="0">
+                            <a:rPr lang="en-US" sz="2000" b="0" i="1" smtClean="0">
                               <a:solidFill>
                                 <a:schemeClr val="tx1"/>
                               </a:solidFill>
@@ -19506,7 +20502,7 @@
                         </m:sSupPr>
                         <m:e>
                           <m:r>
-                            <a:rPr lang="en-US" b="0" i="1" smtClean="0">
+                            <a:rPr lang="en-US" sz="2000" b="0" i="1" smtClean="0">
                               <a:solidFill>
                                 <a:schemeClr val="tx1"/>
                               </a:solidFill>
@@ -19518,7 +20514,7 @@
                         </m:e>
                         <m:sup>
                           <m:r>
-                            <a:rPr lang="en-US" b="0" i="1" smtClean="0">
+                            <a:rPr lang="en-US" sz="2000" b="0" i="1" smtClean="0">
                               <a:solidFill>
                                 <a:schemeClr val="tx1"/>
                               </a:solidFill>
@@ -19531,7 +20527,7 @@
                             <m:rPr>
                               <m:sty m:val="p"/>
                             </m:rPr>
-                            <a:rPr lang="en-US" b="0" i="1" smtClean="0">
+                            <a:rPr lang="en-US" sz="2000" b="0" i="1" smtClean="0">
                               <a:solidFill>
                                 <a:schemeClr val="tx1"/>
                               </a:solidFill>
@@ -19543,7 +20539,7 @@
                         </m:sup>
                       </m:sSup>
                       <m:r>
-                        <a:rPr lang="en-US" b="0" i="1" smtClean="0">
+                        <a:rPr lang="en-US" sz="2000" b="0" i="1" smtClean="0">
                           <a:solidFill>
                             <a:schemeClr val="tx1"/>
                           </a:solidFill>
@@ -19555,7 +20551,7 @@
                     </m:oMath>
                   </m:oMathPara>
                 </a14:m>
-                <a:endParaRPr lang="en-US" b="0" dirty="0">
+                <a:endParaRPr lang="en-US" sz="2000" b="0" dirty="0">
                   <a:solidFill>
                     <a:schemeClr val="tx1"/>
                   </a:solidFill>
@@ -19565,7 +20561,7 @@
               </a:p>
               <a:p>
                 <a:r>
-                  <a:rPr lang="en-US" b="0" dirty="0">
+                  <a:rPr lang="en-US" sz="2000" b="0" dirty="0">
                     <a:solidFill>
                       <a:schemeClr val="tx1"/>
                     </a:solidFill>
@@ -19577,7 +20573,7 @@
                 <a14:m>
                   <m:oMath xmlns:m="http://schemas.openxmlformats.org/officeDocument/2006/math">
                     <m:r>
-                      <a:rPr lang="en-US" i="1">
+                      <a:rPr lang="en-US" sz="2000" i="1">
                         <a:solidFill>
                           <a:schemeClr val="tx1"/>
                         </a:solidFill>
@@ -19589,7 +20585,7 @@
                     <m:d>
                       <m:dPr>
                         <m:ctrlPr>
-                          <a:rPr lang="en-US" i="1">
+                          <a:rPr lang="en-US" sz="2000" i="1">
                             <a:solidFill>
                               <a:schemeClr val="tx1"/>
                             </a:solidFill>
@@ -19602,7 +20598,7 @@
                         <m:sSub>
                           <m:sSubPr>
                             <m:ctrlPr>
-                              <a:rPr lang="en-US" i="1">
+                              <a:rPr lang="en-US" sz="2000" i="1">
                                 <a:solidFill>
                                   <a:schemeClr val="tx1"/>
                                 </a:solidFill>
@@ -19613,7 +20609,7 @@
                           </m:sSubPr>
                           <m:e>
                             <m:r>
-                              <a:rPr lang="en-US" i="1">
+                              <a:rPr lang="en-US" sz="2000" i="1">
                                 <a:solidFill>
                                   <a:schemeClr val="tx1"/>
                                 </a:solidFill>
@@ -19625,7 +20621,7 @@
                           </m:e>
                           <m:sub>
                             <m:r>
-                              <a:rPr lang="en-US" i="1">
+                              <a:rPr lang="en-US" sz="2000" i="1">
                                 <a:solidFill>
                                   <a:schemeClr val="tx1"/>
                                 </a:solidFill>
@@ -19641,7 +20637,7 @@
                   </m:oMath>
                 </a14:m>
                 <a:r>
-                  <a:rPr lang="en-US" b="0" dirty="0">
+                  <a:rPr lang="en-US" sz="2000" b="0" dirty="0">
                     <a:solidFill>
                       <a:schemeClr val="tx1"/>
                     </a:solidFill>
@@ -19656,7 +20652,7 @@
                       <m:rPr>
                         <m:sty m:val="p"/>
                       </m:rPr>
-                      <a:rPr lang="en-US" b="0" i="1" smtClean="0">
+                      <a:rPr lang="en-US" sz="2000" b="0" i="1" smtClean="0">
                         <a:solidFill>
                           <a:schemeClr val="tx1"/>
                         </a:solidFill>
@@ -19666,7 +20662,7 @@
                       <m:t>t</m:t>
                     </m:r>
                     <m:r>
-                      <a:rPr lang="en-US" b="0" i="1" smtClean="0">
+                      <a:rPr lang="en-US" sz="2000" b="0" i="1" smtClean="0">
                         <a:solidFill>
                           <a:schemeClr val="tx1"/>
                         </a:solidFill>
@@ -19678,7 +20674,7 @@
                   </m:oMath>
                 </a14:m>
                 <a:r>
-                  <a:rPr lang="en-US" b="0" dirty="0">
+                  <a:rPr lang="en-US" sz="2000" b="0" dirty="0">
                     <a:solidFill>
                       <a:schemeClr val="tx1"/>
                     </a:solidFill>
@@ -19690,7 +20686,7 @@
               </a:p>
               <a:p>
                 <a:r>
-                  <a:rPr lang="en-US" b="0" dirty="0">
+                  <a:rPr lang="en-US" sz="2000" b="0" dirty="0">
                     <a:solidFill>
                       <a:schemeClr val="tx1"/>
                     </a:solidFill>
@@ -19702,7 +20698,7 @@
               </a:p>
               <a:p>
                 <a:r>
-                  <a:rPr lang="en-US" b="0" dirty="0">
+                  <a:rPr lang="en-US" sz="2000" b="0" dirty="0">
                     <a:solidFill>
                       <a:schemeClr val="tx1"/>
                     </a:solidFill>
@@ -19716,7 +20712,7 @@
                     <m:sSub>
                       <m:sSubPr>
                         <m:ctrlPr>
-                          <a:rPr lang="en-US" b="0" i="1" smtClean="0">
+                          <a:rPr lang="en-US" sz="2000" b="0" i="1" smtClean="0">
                             <a:solidFill>
                               <a:schemeClr val="tx1"/>
                             </a:solidFill>
@@ -19727,7 +20723,7 @@
                       </m:sSubPr>
                       <m:e>
                         <m:r>
-                          <a:rPr lang="en-US" b="0" i="1" smtClean="0">
+                          <a:rPr lang="en-US" sz="2000" b="0" i="1" smtClean="0">
                             <a:solidFill>
                               <a:schemeClr val="tx1"/>
                             </a:solidFill>
@@ -19739,7 +20735,7 @@
                       </m:e>
                       <m:sub>
                         <m:r>
-                          <a:rPr lang="en-US" b="0" i="1" smtClean="0">
+                          <a:rPr lang="en-US" sz="2000" b="0" i="1" smtClean="0">
                             <a:solidFill>
                               <a:schemeClr val="tx1"/>
                             </a:solidFill>
@@ -19753,7 +20749,7 @@
                   </m:oMath>
                 </a14:m>
                 <a:r>
-                  <a:rPr lang="en-US" dirty="0">
+                  <a:rPr lang="en-US" sz="2000" dirty="0">
                     <a:solidFill>
                       <a:schemeClr val="tx1"/>
                     </a:solidFill>
@@ -19777,22 +20773,10 @@
                 <a:pPr marL="0" indent="0">
                   <a:buNone/>
                 </a:pPr>
-                <a:endParaRPr lang="en-US" b="0" dirty="0">
-                  <a:solidFill>
-                    <a:schemeClr val="tx1"/>
-                  </a:solidFill>
-                  <a:latin typeface="Cambria Math" panose="02040503050406030204" pitchFamily="18" charset="0"/>
-                  <a:ea typeface="Cambria Math" panose="02040503050406030204" pitchFamily="18" charset="0"/>
-                </a:endParaRPr>
-              </a:p>
-              <a:p>
-                <a:pPr marL="0" indent="0">
-                  <a:buNone/>
-                </a:pPr>
                 <a:r>
-                  <a:rPr lang="en-US" dirty="0">
+                  <a:rPr lang="en-US" sz="2400" dirty="0">
                     <a:solidFill>
-                      <a:schemeClr val="tx1"/>
+                      <a:schemeClr val="accent1"/>
                     </a:solidFill>
                     <a:latin typeface="Cambria Math" panose="02040503050406030204" pitchFamily="18" charset="0"/>
                     <a:ea typeface="Cambria Math" panose="02040503050406030204" pitchFamily="18" charset="0"/>
@@ -19805,9 +20789,9 @@
                       <m:rPr>
                         <m:sty m:val="p"/>
                       </m:rPr>
-                      <a:rPr lang="en-US" b="0" i="1" smtClean="0">
+                      <a:rPr lang="en-US" sz="2400" b="0" i="1" smtClean="0">
                         <a:solidFill>
-                          <a:schemeClr val="tx1"/>
+                          <a:schemeClr val="accent1"/>
                         </a:solidFill>
                         <a:latin typeface="Cambria Math" panose="02040503050406030204" pitchFamily="18" charset="0"/>
                         <a:ea typeface="Cambria Math" panose="02040503050406030204" pitchFamily="18" charset="0"/>
@@ -19817,9 +20801,9 @@
                   </m:oMath>
                 </a14:m>
                 <a:r>
-                  <a:rPr lang="en-US" b="0" dirty="0">
+                  <a:rPr lang="en-US" sz="2400" b="0" dirty="0">
                     <a:solidFill>
-                      <a:schemeClr val="tx1"/>
+                      <a:schemeClr val="accent1"/>
                     </a:solidFill>
                     <a:latin typeface="Cambria Math" panose="02040503050406030204" pitchFamily="18" charset="0"/>
                     <a:ea typeface="Cambria Math" panose="02040503050406030204" pitchFamily="18" charset="0"/>
@@ -19829,7 +20813,7 @@
               </a:p>
               <a:p>
                 <a:r>
-                  <a:rPr lang="en-US" dirty="0">
+                  <a:rPr lang="en-US" sz="2000" dirty="0">
                     <a:solidFill>
                       <a:schemeClr val="tx1"/>
                     </a:solidFill>
@@ -19841,7 +20825,7 @@
                 <a14:m>
                   <m:oMath xmlns:m="http://schemas.openxmlformats.org/officeDocument/2006/math">
                     <m:r>
-                      <a:rPr lang="en-US" i="1">
+                      <a:rPr lang="en-US" sz="2000" i="1">
                         <a:solidFill>
                           <a:schemeClr val="tx1"/>
                         </a:solidFill>
@@ -19853,7 +20837,7 @@
                     <m:d>
                       <m:dPr>
                         <m:ctrlPr>
-                          <a:rPr lang="en-US" i="1">
+                          <a:rPr lang="en-US" sz="2000" i="1">
                             <a:solidFill>
                               <a:schemeClr val="tx1"/>
                             </a:solidFill>
@@ -19866,7 +20850,7 @@
                         <m:sSub>
                           <m:sSubPr>
                             <m:ctrlPr>
-                              <a:rPr lang="en-US" i="1">
+                              <a:rPr lang="en-US" sz="2000" i="1">
                                 <a:solidFill>
                                   <a:schemeClr val="tx1"/>
                                 </a:solidFill>
@@ -19877,7 +20861,7 @@
                           </m:sSubPr>
                           <m:e>
                             <m:r>
-                              <a:rPr lang="en-US" i="1">
+                              <a:rPr lang="en-US" sz="2000" i="1">
                                 <a:solidFill>
                                   <a:schemeClr val="tx1"/>
                                 </a:solidFill>
@@ -19889,7 +20873,7 @@
                           </m:e>
                           <m:sub>
                             <m:r>
-                              <a:rPr lang="en-US" i="1">
+                              <a:rPr lang="en-US" sz="2000" i="1">
                                 <a:solidFill>
                                   <a:schemeClr val="tx1"/>
                                 </a:solidFill>
@@ -19905,7 +20889,7 @@
                   </m:oMath>
                 </a14:m>
                 <a:r>
-                  <a:rPr lang="en-US" dirty="0">
+                  <a:rPr lang="en-US" sz="2000" dirty="0">
                     <a:solidFill>
                       <a:schemeClr val="tx1"/>
                     </a:solidFill>
@@ -19917,7 +20901,7 @@
               </a:p>
               <a:p>
                 <a:r>
-                  <a:rPr lang="en-US" dirty="0">
+                  <a:rPr lang="en-US" sz="2000" dirty="0">
                     <a:solidFill>
                       <a:schemeClr val="tx1"/>
                     </a:solidFill>
@@ -19931,7 +20915,7 @@
                     <m:sSub>
                       <m:sSubPr>
                         <m:ctrlPr>
-                          <a:rPr lang="en-US" b="0" i="1" smtClean="0">
+                          <a:rPr lang="en-US" sz="2000" b="0" i="1" smtClean="0">
                             <a:solidFill>
                               <a:schemeClr val="tx1"/>
                             </a:solidFill>
@@ -19942,7 +20926,7 @@
                       </m:sSubPr>
                       <m:e>
                         <m:r>
-                          <a:rPr lang="en-US" b="0" i="0" smtClean="0">
+                          <a:rPr lang="en-US" sz="2000" b="0" i="0" smtClean="0">
                             <a:solidFill>
                               <a:schemeClr val="tx1"/>
                             </a:solidFill>
@@ -19954,7 +20938,7 @@
                       </m:e>
                       <m:sub>
                         <m:r>
-                          <a:rPr lang="en-US" b="0" i="0" smtClean="0">
+                          <a:rPr lang="en-US" sz="2000" b="0" i="0" smtClean="0">
                             <a:solidFill>
                               <a:schemeClr val="tx1"/>
                             </a:solidFill>
@@ -19966,7 +20950,7 @@
                       </m:sub>
                     </m:sSub>
                     <m:r>
-                      <a:rPr lang="en-US" b="0" i="1" smtClean="0">
+                      <a:rPr lang="en-US" sz="2000" b="0" i="1" smtClean="0">
                         <a:solidFill>
                           <a:schemeClr val="tx1"/>
                         </a:solidFill>
@@ -19978,7 +20962,7 @@
                     <m:sSub>
                       <m:sSubPr>
                         <m:ctrlPr>
-                          <a:rPr lang="en-US" b="0" i="1" smtClean="0">
+                          <a:rPr lang="en-US" sz="2000" b="0" i="1" smtClean="0">
                             <a:solidFill>
                               <a:schemeClr val="tx1"/>
                             </a:solidFill>
@@ -19989,7 +20973,7 @@
                       </m:sSubPr>
                       <m:e>
                         <m:r>
-                          <a:rPr lang="en-US" b="0" i="1" smtClean="0">
+                          <a:rPr lang="en-US" sz="2000" b="0" i="1" smtClean="0">
                             <a:solidFill>
                               <a:schemeClr val="tx1"/>
                             </a:solidFill>
@@ -20001,7 +20985,7 @@
                       </m:e>
                       <m:sub>
                         <m:r>
-                          <a:rPr lang="en-US" b="0" i="1" smtClean="0">
+                          <a:rPr lang="en-US" sz="2000" b="0" i="1" smtClean="0">
                             <a:solidFill>
                               <a:schemeClr val="tx1"/>
                             </a:solidFill>
@@ -20015,7 +20999,7 @@
                   </m:oMath>
                 </a14:m>
                 <a:r>
-                  <a:rPr lang="en-US" b="0" dirty="0">
+                  <a:rPr lang="en-US" sz="2000" b="0" dirty="0">
                     <a:solidFill>
                       <a:schemeClr val="tx1"/>
                     </a:solidFill>
@@ -20029,7 +21013,7 @@
                     <m:sSub>
                       <m:sSubPr>
                         <m:ctrlPr>
-                          <a:rPr lang="en-US" b="0" i="1" smtClean="0">
+                          <a:rPr lang="en-US" sz="2000" b="0" i="1" smtClean="0">
                             <a:solidFill>
                               <a:schemeClr val="tx1"/>
                             </a:solidFill>
@@ -20040,7 +21024,7 @@
                       </m:sSubPr>
                       <m:e>
                         <m:r>
-                          <a:rPr lang="en-US" b="0" i="1" smtClean="0">
+                          <a:rPr lang="en-US" sz="2000" b="0" i="1" smtClean="0">
                             <a:solidFill>
                               <a:schemeClr val="tx1"/>
                             </a:solidFill>
@@ -20052,7 +21036,7 @@
                       </m:e>
                       <m:sub>
                         <m:r>
-                          <a:rPr lang="en-US" b="0" i="1" smtClean="0">
+                          <a:rPr lang="en-US" sz="2000" b="0" i="1" smtClean="0">
                             <a:solidFill>
                               <a:schemeClr val="tx1"/>
                             </a:solidFill>
@@ -20066,7 +21050,7 @@
                   </m:oMath>
                 </a14:m>
                 <a:r>
-                  <a:rPr lang="en-US" b="0" dirty="0">
+                  <a:rPr lang="en-US" sz="2000" b="0" dirty="0">
                     <a:solidFill>
                       <a:schemeClr val="tx1"/>
                     </a:solidFill>
@@ -20085,7 +21069,7 @@
                     <m:sSub>
                       <m:sSubPr>
                         <m:ctrlPr>
-                          <a:rPr lang="en-US" b="0" i="1" smtClean="0">
+                          <a:rPr lang="en-US" sz="2000" b="0" i="1" smtClean="0">
                             <a:solidFill>
                               <a:schemeClr val="tx1"/>
                             </a:solidFill>
@@ -20096,7 +21080,7 @@
                       </m:sSubPr>
                       <m:e>
                         <m:r>
-                          <a:rPr lang="en-US" b="0" i="1" smtClean="0">
+                          <a:rPr lang="en-US" sz="2000" b="0" i="1" smtClean="0">
                             <a:solidFill>
                               <a:schemeClr val="tx1"/>
                             </a:solidFill>
@@ -20108,7 +21092,7 @@
                       </m:e>
                       <m:sub>
                         <m:r>
-                          <a:rPr lang="en-US" b="0" i="1" smtClean="0">
+                          <a:rPr lang="en-US" sz="2000" b="0" i="1" smtClean="0">
                             <a:solidFill>
                               <a:schemeClr val="tx1"/>
                             </a:solidFill>
@@ -20120,7 +21104,7 @@
                       </m:sub>
                     </m:sSub>
                     <m:r>
-                      <a:rPr lang="en-US" b="0" i="1" smtClean="0">
+                      <a:rPr lang="en-US" sz="2000" b="0" i="1" smtClean="0">
                         <a:solidFill>
                           <a:schemeClr val="tx1"/>
                         </a:solidFill>
@@ -20132,7 +21116,7 @@
                     <m:sSub>
                       <m:sSubPr>
                         <m:ctrlPr>
-                          <a:rPr lang="en-US" b="0" i="1" smtClean="0">
+                          <a:rPr lang="en-US" sz="2000" b="0" i="1" smtClean="0">
                             <a:solidFill>
                               <a:schemeClr val="tx1"/>
                             </a:solidFill>
@@ -20143,7 +21127,7 @@
                       </m:sSubPr>
                       <m:e>
                         <m:r>
-                          <a:rPr lang="en-US" b="0" i="1" smtClean="0">
+                          <a:rPr lang="en-US" sz="2000" b="0" i="1" smtClean="0">
                             <a:solidFill>
                               <a:schemeClr val="tx1"/>
                             </a:solidFill>
@@ -20155,7 +21139,7 @@
                       </m:e>
                       <m:sub>
                         <m:r>
-                          <a:rPr lang="en-US" b="0" i="1" smtClean="0">
+                          <a:rPr lang="en-US" sz="2000" b="0" i="1" smtClean="0">
                             <a:solidFill>
                               <a:schemeClr val="tx1"/>
                             </a:solidFill>
@@ -20165,7 +21149,7 @@
                           <m:t>𝑖</m:t>
                         </m:r>
                         <m:r>
-                          <a:rPr lang="en-US" b="0" i="1" smtClean="0">
+                          <a:rPr lang="en-US" sz="2000" b="0" i="1" smtClean="0">
                             <a:solidFill>
                               <a:schemeClr val="tx1"/>
                             </a:solidFill>
@@ -20177,7 +21161,7 @@
                       </m:sub>
                     </m:sSub>
                     <m:r>
-                      <a:rPr lang="en-US" b="0" i="1" smtClean="0">
+                      <a:rPr lang="en-US" sz="2000" b="0" i="1" smtClean="0">
                         <a:solidFill>
                           <a:schemeClr val="tx1"/>
                         </a:solidFill>
@@ -20189,7 +21173,7 @@
                     <m:sSub>
                       <m:sSubPr>
                         <m:ctrlPr>
-                          <a:rPr lang="en-US" b="0" i="1" smtClean="0">
+                          <a:rPr lang="en-US" sz="2000" b="0" i="1" smtClean="0">
                             <a:solidFill>
                               <a:schemeClr val="tx1"/>
                             </a:solidFill>
@@ -20200,7 +21184,7 @@
                       </m:sSubPr>
                       <m:e>
                         <m:r>
-                          <a:rPr lang="en-US" b="0" i="1" smtClean="0">
+                          <a:rPr lang="en-US" sz="2000" b="0" i="1" smtClean="0">
                             <a:solidFill>
                               <a:schemeClr val="tx1"/>
                             </a:solidFill>
@@ -20212,7 +21196,7 @@
                       </m:e>
                       <m:sub>
                         <m:r>
-                          <a:rPr lang="en-US" b="0" i="1" smtClean="0">
+                          <a:rPr lang="en-US" sz="2000" b="0" i="1" smtClean="0">
                             <a:solidFill>
                               <a:schemeClr val="tx1"/>
                             </a:solidFill>
@@ -20226,7 +21210,7 @@
                   </m:oMath>
                 </a14:m>
                 <a:r>
-                  <a:rPr lang="en-US" b="0" dirty="0">
+                  <a:rPr lang="en-US" sz="2000" b="0" dirty="0">
                     <a:solidFill>
                       <a:schemeClr val="tx1"/>
                     </a:solidFill>
@@ -20238,7 +21222,7 @@
               </a:p>
               <a:p>
                 <a:r>
-                  <a:rPr lang="en-US" dirty="0">
+                  <a:rPr lang="en-US" sz="2000" dirty="0">
                     <a:solidFill>
                       <a:schemeClr val="tx1"/>
                     </a:solidFill>
@@ -20252,7 +21236,7 @@
                     <m:sSub>
                       <m:sSubPr>
                         <m:ctrlPr>
-                          <a:rPr lang="en-US" b="0" i="1" smtClean="0">
+                          <a:rPr lang="en-US" sz="2000" b="0" i="1" smtClean="0">
                             <a:solidFill>
                               <a:schemeClr val="tx1"/>
                             </a:solidFill>
@@ -20266,7 +21250,7 @@
                           <m:rPr>
                             <m:sty m:val="p"/>
                           </m:rPr>
-                          <a:rPr lang="en-US" b="0" i="0" smtClean="0">
+                          <a:rPr lang="en-US" sz="2000" b="0" i="0" smtClean="0">
                             <a:solidFill>
                               <a:schemeClr val="tx1"/>
                             </a:solidFill>
@@ -20278,7 +21262,7 @@
                       </m:e>
                       <m:sub>
                         <m:r>
-                          <a:rPr lang="en-US" b="0" i="0" smtClean="0">
+                          <a:rPr lang="en-US" sz="2000" b="0" i="0" smtClean="0">
                             <a:solidFill>
                               <a:schemeClr val="tx1"/>
                             </a:solidFill>
@@ -20288,7 +21272,7 @@
                           <m:t>𝑒𝑠𝑡</m:t>
                         </m:r>
                         <m:r>
-                          <a:rPr lang="en-US" b="0" i="1" smtClean="0">
+                          <a:rPr lang="en-US" sz="2000" b="0" i="1" smtClean="0">
                             <a:solidFill>
                               <a:schemeClr val="tx1"/>
                             </a:solidFill>
@@ -20300,7 +21284,7 @@
                       </m:sub>
                     </m:sSub>
                     <m:r>
-                      <a:rPr lang="en-US" b="0" i="1" smtClean="0">
+                      <a:rPr lang="en-US" sz="2000" b="0" i="1" smtClean="0">
                         <a:solidFill>
                           <a:schemeClr val="tx1"/>
                         </a:solidFill>
@@ -20310,7 +21294,7 @@
                       <m:t>=2</m:t>
                     </m:r>
                     <m:r>
-                      <a:rPr lang="en-US" b="0" i="1" smtClean="0">
+                      <a:rPr lang="en-US" sz="2000" b="0" i="1" smtClean="0">
                         <a:solidFill>
                           <a:schemeClr val="tx1"/>
                         </a:solidFill>
@@ -20323,7 +21307,7 @@
                       <m:rPr>
                         <m:lit/>
                       </m:rPr>
-                      <a:rPr lang="en-US" b="0" i="1" smtClean="0">
+                      <a:rPr lang="en-US" sz="2000" b="0" i="1" smtClean="0">
                         <a:solidFill>
                           <a:schemeClr val="tx1"/>
                         </a:solidFill>
@@ -20333,7 +21317,7 @@
                       <m:t>/</m:t>
                     </m:r>
                     <m:r>
-                      <a:rPr lang="en-US" b="0" i="1" smtClean="0">
+                      <a:rPr lang="en-US" sz="2000" b="0" i="1" smtClean="0">
                         <a:solidFill>
                           <a:schemeClr val="tx1"/>
                         </a:solidFill>
@@ -20345,7 +21329,7 @@
                     <m:d>
                       <m:dPr>
                         <m:ctrlPr>
-                          <a:rPr lang="en-US" b="0" i="1" smtClean="0">
+                          <a:rPr lang="en-US" sz="2000" b="0" i="1" smtClean="0">
                             <a:solidFill>
                               <a:schemeClr val="tx1"/>
                             </a:solidFill>
@@ -20358,7 +21342,7 @@
                         <m:sSub>
                           <m:sSubPr>
                             <m:ctrlPr>
-                              <a:rPr lang="en-US" b="0" i="1" smtClean="0">
+                              <a:rPr lang="en-US" sz="2000" b="0" i="1" smtClean="0">
                                 <a:solidFill>
                                   <a:schemeClr val="tx1"/>
                                 </a:solidFill>
@@ -20369,7 +21353,7 @@
                           </m:sSubPr>
                           <m:e>
                             <m:r>
-                              <a:rPr lang="en-US" b="0" i="1" smtClean="0">
+                              <a:rPr lang="en-US" sz="2000" b="0" i="1" smtClean="0">
                                 <a:solidFill>
                                   <a:schemeClr val="tx1"/>
                                 </a:solidFill>
@@ -20381,7 +21365,7 @@
                           </m:e>
                           <m:sub>
                             <m:r>
-                              <a:rPr lang="en-US" b="0" i="1" smtClean="0">
+                              <a:rPr lang="en-US" sz="2000" b="0" i="1" smtClean="0">
                                 <a:solidFill>
                                   <a:schemeClr val="tx1"/>
                                 </a:solidFill>
@@ -20397,7 +21381,7 @@
                   </m:oMath>
                 </a14:m>
                 <a:r>
-                  <a:rPr lang="en-US" b="0" dirty="0">
+                  <a:rPr lang="en-US" sz="2000" b="0" dirty="0">
                     <a:solidFill>
                       <a:schemeClr val="tx1"/>
                     </a:solidFill>
@@ -20416,7 +21400,7 @@
                     <m:sSub>
                       <m:sSubPr>
                         <m:ctrlPr>
-                          <a:rPr lang="en-US" b="0" i="1" smtClean="0">
+                          <a:rPr lang="en-US" sz="2000" b="0" i="1" smtClean="0">
                             <a:solidFill>
                               <a:schemeClr val="tx1"/>
                             </a:solidFill>
@@ -20427,7 +21411,7 @@
                       </m:sSubPr>
                       <m:e>
                         <m:r>
-                          <a:rPr lang="en-US" b="0" i="1" smtClean="0">
+                          <a:rPr lang="en-US" sz="2000" b="0" i="1" smtClean="0">
                             <a:solidFill>
                               <a:schemeClr val="tx1"/>
                             </a:solidFill>
@@ -20439,7 +21423,7 @@
                       </m:e>
                       <m:sub>
                         <m:r>
-                          <a:rPr lang="en-US" b="0" i="1" smtClean="0">
+                          <a:rPr lang="en-US" sz="2000" b="0" i="1" smtClean="0">
                             <a:solidFill>
                               <a:schemeClr val="tx1"/>
                             </a:solidFill>
@@ -20451,7 +21435,7 @@
                       </m:sub>
                     </m:sSub>
                     <m:r>
-                      <a:rPr lang="en-US" b="0" i="1" smtClean="0">
+                      <a:rPr lang="en-US" sz="2000" b="0" i="1" smtClean="0">
                         <a:solidFill>
                           <a:schemeClr val="tx1"/>
                         </a:solidFill>
@@ -20464,7 +21448,7 @@
                       <m:radPr>
                         <m:degHide m:val="on"/>
                         <m:ctrlPr>
-                          <a:rPr lang="en-US" b="0" i="1" smtClean="0">
+                          <a:rPr lang="en-US" sz="2000" b="0" i="1" smtClean="0">
                             <a:solidFill>
                               <a:schemeClr val="tx1"/>
                             </a:solidFill>
@@ -20478,7 +21462,7 @@
                         <m:sSubSup>
                           <m:sSubSupPr>
                             <m:ctrlPr>
-                              <a:rPr lang="en-US" b="0" i="1" smtClean="0">
+                              <a:rPr lang="en-US" sz="2000" b="0" i="1" smtClean="0">
                                 <a:solidFill>
                                   <a:schemeClr val="tx1"/>
                                 </a:solidFill>
@@ -20492,7 +21476,7 @@
                               <m:rPr>
                                 <m:sty m:val="p"/>
                               </m:rPr>
-                              <a:rPr lang="en-US" b="0" i="0" smtClean="0">
+                              <a:rPr lang="en-US" sz="2000" b="0" i="0" smtClean="0">
                                 <a:solidFill>
                                   <a:schemeClr val="tx1"/>
                                 </a:solidFill>
@@ -20504,7 +21488,7 @@
                           </m:e>
                           <m:sub>
                             <m:r>
-                              <a:rPr lang="en-US" b="0" i="1" smtClean="0">
+                              <a:rPr lang="en-US" sz="2000" b="0" i="1" smtClean="0">
                                 <a:solidFill>
                                   <a:schemeClr val="tx1"/>
                                 </a:solidFill>
@@ -20516,7 +21500,7 @@
                           </m:sub>
                           <m:sup>
                             <m:r>
-                              <a:rPr lang="en-US" b="0" i="1" smtClean="0">
+                              <a:rPr lang="en-US" sz="2000" b="0" i="1" smtClean="0">
                                 <a:solidFill>
                                   <a:schemeClr val="tx1"/>
                                 </a:solidFill>
@@ -20528,7 +21512,7 @@
                           </m:sup>
                         </m:sSubSup>
                         <m:r>
-                          <a:rPr lang="en-US" b="0" i="1" smtClean="0">
+                          <a:rPr lang="en-US" sz="2000" b="0" i="1" smtClean="0">
                             <a:solidFill>
                               <a:schemeClr val="tx1"/>
                             </a:solidFill>
@@ -20540,7 +21524,7 @@
                         <m:sSubSup>
                           <m:sSubSupPr>
                             <m:ctrlPr>
-                              <a:rPr lang="en-US" b="0" i="1" smtClean="0">
+                              <a:rPr lang="en-US" sz="2000" b="0" i="1" smtClean="0">
                                 <a:solidFill>
                                   <a:schemeClr val="tx1"/>
                                 </a:solidFill>
@@ -20551,7 +21535,7 @@
                           </m:sSubSupPr>
                           <m:e>
                             <m:r>
-                              <a:rPr lang="en-US" b="0" i="1" smtClean="0">
+                              <a:rPr lang="en-US" sz="2000" b="0" i="1" smtClean="0">
                                 <a:solidFill>
                                   <a:schemeClr val="tx1"/>
                                 </a:solidFill>
@@ -20563,7 +21547,7 @@
                           </m:e>
                           <m:sub>
                             <m:r>
-                              <a:rPr lang="en-US" b="0" i="1" smtClean="0">
+                              <a:rPr lang="en-US" sz="2000" b="0" i="1" smtClean="0">
                                 <a:solidFill>
                                   <a:schemeClr val="tx1"/>
                                 </a:solidFill>
@@ -20575,7 +21559,7 @@
                           </m:sub>
                           <m:sup>
                             <m:r>
-                              <a:rPr lang="en-US" b="0" i="1" smtClean="0">
+                              <a:rPr lang="en-US" sz="2000" b="0" i="1" smtClean="0">
                                 <a:solidFill>
                                   <a:schemeClr val="tx1"/>
                                 </a:solidFill>
@@ -20591,7 +21575,7 @@
                   </m:oMath>
                 </a14:m>
                 <a:r>
-                  <a:rPr lang="en-US" b="0" dirty="0">
+                  <a:rPr lang="en-US" sz="2000" b="0" dirty="0">
                     <a:solidFill>
                       <a:schemeClr val="tx1"/>
                     </a:solidFill>
@@ -20759,7 +21743,7 @@
             </p:txBody>
           </p:sp>
         </mc:Choice>
-        <mc:Fallback xmlns="">
+        <mc:Fallback>
           <p:sp>
             <p:nvSpPr>
               <p:cNvPr id="9" name="Content Placeholder 3">
@@ -20776,8 +21760,8 @@
             </p:nvSpPr>
             <p:spPr>
               <a:xfrm>
-                <a:off x="6289697" y="454865"/>
-                <a:ext cx="4280176" cy="6233318"/>
+                <a:off x="6289697" y="262468"/>
+                <a:ext cx="4280176" cy="6595532"/>
               </a:xfrm>
               <a:prstGeom prst="rect">
                 <a:avLst/>
@@ -20785,7 +21769,7 @@
               <a:blipFill>
                 <a:blip r:embed="rId4"/>
                 <a:stretch>
-                  <a:fillRect l="-1183" t="-1018"/>
+                  <a:fillRect l="-1775" t="-577" r="-2071"/>
                 </a:stretch>
               </a:blipFill>
             </p:spPr>
@@ -20871,7 +21855,7 @@
 </p:sld>
 </file>
 
-<file path=ppt/slides/slide4.xml><?xml version="1.0" encoding="utf-8"?>
+<file path=ppt/slides/slide5.xml><?xml version="1.0" encoding="utf-8"?>
 <p:sld xmlns:a="http://schemas.openxmlformats.org/drawingml/2006/main" xmlns:r="http://schemas.openxmlformats.org/officeDocument/2006/relationships" xmlns:p="http://schemas.openxmlformats.org/presentationml/2006/main">
   <p:cSld>
     <p:spTree>
@@ -20924,8 +21908,8 @@
           </a:p>
         </p:txBody>
       </p:sp>
-      <mc:AlternateContent xmlns:mc="http://schemas.openxmlformats.org/markup-compatibility/2006" xmlns:a14="http://schemas.microsoft.com/office/drawing/2010/main">
-        <mc:Choice Requires="a14">
+      <mc:AlternateContent xmlns:mc="http://schemas.openxmlformats.org/markup-compatibility/2006">
+        <mc:Choice xmlns:a14="http://schemas.microsoft.com/office/drawing/2010/main" Requires="a14">
           <p:sp>
             <p:nvSpPr>
               <p:cNvPr id="3" name="Content Placeholder 2">
@@ -20955,7 +21939,7 @@
               <a:lstStyle/>
               <a:p>
                 <a:r>
-                  <a:rPr lang="en-US" dirty="0">
+                  <a:rPr lang="en-US" sz="2000" dirty="0">
                     <a:solidFill>
                       <a:schemeClr val="tx1"/>
                     </a:solidFill>
@@ -20969,7 +21953,7 @@
                     <m:sSub>
                       <m:sSubPr>
                         <m:ctrlPr>
-                          <a:rPr lang="en-US" b="0" i="1" smtClean="0">
+                          <a:rPr lang="en-US" sz="2000" b="0" i="1" smtClean="0">
                             <a:solidFill>
                               <a:schemeClr val="tx1"/>
                             </a:solidFill>
@@ -20980,7 +21964,7 @@
                       </m:sSubPr>
                       <m:e>
                         <m:r>
-                          <a:rPr lang="en-US" b="0" i="1" smtClean="0">
+                          <a:rPr lang="en-US" sz="2000" b="0" i="1" smtClean="0">
                             <a:solidFill>
                               <a:schemeClr val="tx1"/>
                             </a:solidFill>
@@ -20992,7 +21976,7 @@
                       </m:e>
                       <m:sub>
                         <m:r>
-                          <a:rPr lang="en-US" b="0" i="1" smtClean="0">
+                          <a:rPr lang="en-US" sz="2000" b="0" i="1" smtClean="0">
                             <a:solidFill>
                               <a:schemeClr val="tx1"/>
                             </a:solidFill>
@@ -21004,7 +21988,7 @@
                       </m:sub>
                     </m:sSub>
                     <m:r>
-                      <a:rPr lang="en-US" b="0" i="1" smtClean="0">
+                      <a:rPr lang="en-US" sz="2000" b="0" i="1" smtClean="0">
                         <a:solidFill>
                           <a:schemeClr val="tx1"/>
                         </a:solidFill>
@@ -21016,7 +22000,7 @@
                     <m:sSub>
                       <m:sSubPr>
                         <m:ctrlPr>
-                          <a:rPr lang="en-US" b="0" i="1" smtClean="0">
+                          <a:rPr lang="en-US" sz="2000" b="0" i="1" smtClean="0">
                             <a:solidFill>
                               <a:schemeClr val="tx1"/>
                             </a:solidFill>
@@ -21027,7 +22011,7 @@
                       </m:sSubPr>
                       <m:e>
                         <m:r>
-                          <a:rPr lang="en-US" b="0" i="1" smtClean="0">
+                          <a:rPr lang="en-US" sz="2000" b="0" i="1" smtClean="0">
                             <a:solidFill>
                               <a:schemeClr val="tx1"/>
                             </a:solidFill>
@@ -21039,7 +22023,7 @@
                       </m:e>
                       <m:sub>
                         <m:r>
-                          <a:rPr lang="en-US" b="0" i="1" smtClean="0">
+                          <a:rPr lang="en-US" sz="2000" b="0" i="1" smtClean="0">
                             <a:solidFill>
                               <a:schemeClr val="tx1"/>
                             </a:solidFill>
@@ -21053,7 +22037,7 @@
                   </m:oMath>
                 </a14:m>
                 <a:r>
-                  <a:rPr lang="en-US" b="0" dirty="0">
+                  <a:rPr lang="en-US" sz="2000" b="0" dirty="0">
                     <a:solidFill>
                       <a:schemeClr val="tx1"/>
                     </a:solidFill>
@@ -21067,7 +22051,7 @@
                     <m:sSub>
                       <m:sSubPr>
                         <m:ctrlPr>
-                          <a:rPr lang="en-US" b="0" i="1" smtClean="0">
+                          <a:rPr lang="en-US" sz="2000" b="0" i="1" smtClean="0">
                             <a:solidFill>
                               <a:schemeClr val="tx1"/>
                             </a:solidFill>
@@ -21078,7 +22062,7 @@
                       </m:sSubPr>
                       <m:e>
                         <m:r>
-                          <a:rPr lang="en-US" b="0" i="1" smtClean="0">
+                          <a:rPr lang="en-US" sz="2000" b="0" i="1" smtClean="0">
                             <a:solidFill>
                               <a:schemeClr val="tx1"/>
                             </a:solidFill>
@@ -21090,7 +22074,7 @@
                       </m:e>
                       <m:sub>
                         <m:r>
-                          <a:rPr lang="en-US" b="0" i="1" smtClean="0">
+                          <a:rPr lang="en-US" sz="2000" b="0" i="1" smtClean="0">
                             <a:solidFill>
                               <a:schemeClr val="tx1"/>
                             </a:solidFill>
@@ -21102,7 +22086,7 @@
                       </m:sub>
                     </m:sSub>
                     <m:r>
-                      <a:rPr lang="en-US" b="0" i="1" smtClean="0">
+                      <a:rPr lang="en-US" sz="2000" b="0" i="1" smtClean="0">
                         <a:solidFill>
                           <a:schemeClr val="tx1"/>
                         </a:solidFill>
@@ -21114,7 +22098,7 @@
                     <m:sSub>
                       <m:sSubPr>
                         <m:ctrlPr>
-                          <a:rPr lang="en-US" b="0" i="1" smtClean="0">
+                          <a:rPr lang="en-US" sz="2000" b="0" i="1" smtClean="0">
                             <a:solidFill>
                               <a:schemeClr val="tx1"/>
                             </a:solidFill>
@@ -21125,7 +22109,7 @@
                       </m:sSubPr>
                       <m:e>
                         <m:r>
-                          <a:rPr lang="en-US" b="0" i="1" smtClean="0">
+                          <a:rPr lang="en-US" sz="2000" b="0" i="1" smtClean="0">
                             <a:solidFill>
                               <a:schemeClr val="tx1"/>
                             </a:solidFill>
@@ -21137,7 +22121,7 @@
                       </m:e>
                       <m:sub>
                         <m:r>
-                          <a:rPr lang="en-US" b="0" i="1" smtClean="0">
+                          <a:rPr lang="en-US" sz="2000" b="0" i="1" smtClean="0">
                             <a:solidFill>
                               <a:schemeClr val="tx1"/>
                             </a:solidFill>
@@ -21151,7 +22135,7 @@
                   </m:oMath>
                 </a14:m>
                 <a:r>
-                  <a:rPr lang="en-US" b="0" dirty="0">
+                  <a:rPr lang="en-US" sz="2000" b="0" dirty="0">
                     <a:solidFill>
                       <a:schemeClr val="tx1"/>
                     </a:solidFill>
@@ -21163,7 +22147,7 @@
                 <a14:m>
                   <m:oMath xmlns:m="http://schemas.openxmlformats.org/officeDocument/2006/math">
                     <m:r>
-                      <a:rPr lang="en-US" i="1">
+                      <a:rPr lang="en-US" sz="2000" i="1">
                         <a:solidFill>
                           <a:schemeClr val="tx1"/>
                         </a:solidFill>
@@ -21175,7 +22159,7 @@
                     <m:d>
                       <m:dPr>
                         <m:ctrlPr>
-                          <a:rPr lang="en-US" i="1">
+                          <a:rPr lang="en-US" sz="2000" i="1">
                             <a:solidFill>
                               <a:schemeClr val="tx1"/>
                             </a:solidFill>
@@ -21188,7 +22172,7 @@
                         <m:sSub>
                           <m:sSubPr>
                             <m:ctrlPr>
-                              <a:rPr lang="en-US" i="1">
+                              <a:rPr lang="en-US" sz="2000" i="1">
                                 <a:solidFill>
                                   <a:schemeClr val="tx1"/>
                                 </a:solidFill>
@@ -21199,7 +22183,7 @@
                           </m:sSubPr>
                           <m:e>
                             <m:r>
-                              <a:rPr lang="en-US" i="1">
+                              <a:rPr lang="en-US" sz="2000" i="1">
                                 <a:solidFill>
                                   <a:schemeClr val="tx1"/>
                                 </a:solidFill>
@@ -21211,7 +22195,7 @@
                           </m:e>
                           <m:sub>
                             <m:r>
-                              <a:rPr lang="en-US" i="1">
+                              <a:rPr lang="en-US" sz="2000" i="1">
                                 <a:solidFill>
                                   <a:schemeClr val="tx1"/>
                                 </a:solidFill>
@@ -21225,7 +22209,7 @@
                       </m:e>
                     </m:d>
                     <m:r>
-                      <a:rPr lang="en-US" b="0" i="1" smtClean="0">
+                      <a:rPr lang="en-US" sz="2000" b="0" i="1" smtClean="0">
                         <a:solidFill>
                           <a:schemeClr val="tx1"/>
                         </a:solidFill>
@@ -21236,7 +22220,19 @@
                     </m:r>
                   </m:oMath>
                 </a14:m>
-                <a:endParaRPr lang="en-US" b="0" dirty="0">
+                <a:endParaRPr lang="en-US" sz="2000" b="0" dirty="0">
+                  <a:solidFill>
+                    <a:schemeClr val="tx1"/>
+                  </a:solidFill>
+                  <a:latin typeface="Cambria Math" panose="02040503050406030204" pitchFamily="18" charset="0"/>
+                  <a:ea typeface="Cambria Math" panose="02040503050406030204" pitchFamily="18" charset="0"/>
+                </a:endParaRPr>
+              </a:p>
+              <a:p>
+                <a:pPr marL="0" indent="0">
+                  <a:buNone/>
+                </a:pPr>
+                <a:endParaRPr lang="en-US" sz="2000" b="0" dirty="0">
                   <a:solidFill>
                     <a:schemeClr val="tx1"/>
                   </a:solidFill>
@@ -21246,7 +22242,7 @@
               </a:p>
               <a:p>
                 <a:r>
-                  <a:rPr lang="en-US" dirty="0">
+                  <a:rPr lang="en-US" sz="2000" dirty="0">
                     <a:solidFill>
                       <a:schemeClr val="tx1"/>
                     </a:solidFill>
@@ -21257,22 +22253,34 @@
                 </a:r>
               </a:p>
               <a:p>
+                <a:pPr marL="0" indent="0">
+                  <a:buNone/>
+                </a:pPr>
+                <a:endParaRPr lang="en-US" sz="2000" dirty="0">
+                  <a:solidFill>
+                    <a:schemeClr val="tx1"/>
+                  </a:solidFill>
+                  <a:latin typeface="Cambria Math" panose="02040503050406030204" pitchFamily="18" charset="0"/>
+                  <a:ea typeface="Cambria Math" panose="02040503050406030204" pitchFamily="18" charset="0"/>
+                </a:endParaRPr>
+              </a:p>
+              <a:p>
                 <a:r>
-                  <a:rPr lang="en-US" dirty="0">
+                  <a:rPr lang="en-US" sz="2000" dirty="0">
                     <a:solidFill>
                       <a:schemeClr val="tx1"/>
                     </a:solidFill>
                     <a:latin typeface="Cambria Math" panose="02040503050406030204" pitchFamily="18" charset="0"/>
                     <a:ea typeface="Cambria Math" panose="02040503050406030204" pitchFamily="18" charset="0"/>
                   </a:rPr>
-                  <a:t>We can estimate the decay timescale, </a:t>
+                  <a:t>We can estimate the decay timescale,	 </a:t>
                 </a:r>
                 <a14:m>
                   <m:oMath xmlns:m="http://schemas.openxmlformats.org/officeDocument/2006/math">
                     <m:sSub>
                       <m:sSubPr>
                         <m:ctrlPr>
-                          <a:rPr lang="en-US" b="0" i="1" smtClean="0">
+                          <a:rPr lang="en-US" sz="2000" b="0" i="1" smtClean="0">
                             <a:solidFill>
                               <a:schemeClr val="tx1"/>
                             </a:solidFill>
@@ -21283,7 +22291,7 @@
                       </m:sSubPr>
                       <m:e>
                         <m:r>
-                          <a:rPr lang="en-US" b="0" i="1" smtClean="0">
+                          <a:rPr lang="en-US" sz="2000" b="0" i="1" smtClean="0">
                             <a:solidFill>
                               <a:schemeClr val="tx1"/>
                             </a:solidFill>
@@ -21295,7 +22303,7 @@
                       </m:e>
                       <m:sub>
                         <m:r>
-                          <a:rPr lang="en-US" b="0" i="1" smtClean="0">
+                          <a:rPr lang="en-US" sz="2000" b="0" i="1" smtClean="0">
                             <a:solidFill>
                               <a:schemeClr val="tx1"/>
                             </a:solidFill>
@@ -21307,7 +22315,7 @@
                       </m:sub>
                     </m:sSub>
                     <m:r>
-                      <a:rPr lang="en-US" b="0" i="1" smtClean="0">
+                      <a:rPr lang="en-US" sz="2000" b="0" i="1" smtClean="0">
                         <a:solidFill>
                           <a:schemeClr val="tx1"/>
                         </a:solidFill>
@@ -21320,7 +22328,7 @@
                       <m:rPr>
                         <m:sty m:val="p"/>
                       </m:rPr>
-                      <a:rPr lang="en-US" b="0" i="1" smtClean="0">
+                      <a:rPr lang="en-US" sz="2000" b="0" i="1" smtClean="0">
                         <a:solidFill>
                           <a:schemeClr val="tx1"/>
                         </a:solidFill>
@@ -21332,7 +22340,7 @@
                   </m:oMath>
                 </a14:m>
                 <a:r>
-                  <a:rPr lang="en-US" b="0" dirty="0">
+                  <a:rPr lang="en-US" sz="2000" b="0" dirty="0">
                     <a:solidFill>
                       <a:schemeClr val="tx1"/>
                     </a:solidFill>
@@ -21346,7 +22354,7 @@
                     <m:sSub>
                       <m:sSubPr>
                         <m:ctrlPr>
-                          <a:rPr lang="en-US" b="0" i="1" smtClean="0">
+                          <a:rPr lang="en-US" sz="2000" b="0" i="1" smtClean="0">
                             <a:solidFill>
                               <a:schemeClr val="tx1"/>
                             </a:solidFill>
@@ -21357,7 +22365,7 @@
                       </m:sSubPr>
                       <m:e>
                         <m:r>
-                          <a:rPr lang="en-US" b="0" i="1" smtClean="0">
+                          <a:rPr lang="en-US" sz="2000" b="0" i="1" smtClean="0">
                             <a:solidFill>
                               <a:schemeClr val="tx1"/>
                             </a:solidFill>
@@ -21369,7 +22377,7 @@
                       </m:e>
                       <m:sub>
                         <m:r>
-                          <a:rPr lang="en-US" b="0" i="1" smtClean="0">
+                          <a:rPr lang="en-US" sz="2000" b="0" i="1" smtClean="0">
                             <a:solidFill>
                               <a:schemeClr val="tx1"/>
                             </a:solidFill>
@@ -21381,7 +22389,7 @@
                       </m:sub>
                     </m:sSub>
                     <m:r>
-                      <a:rPr lang="en-US" b="0" i="1" smtClean="0">
+                      <a:rPr lang="en-US" sz="2000" b="0" i="1" smtClean="0">
                         <a:solidFill>
                           <a:schemeClr val="tx1"/>
                         </a:solidFill>
@@ -21394,7 +22402,7 @@
                       <m:rPr>
                         <m:sty m:val="p"/>
                       </m:rPr>
-                      <a:rPr lang="en-US" b="0" i="1" smtClean="0">
+                      <a:rPr lang="en-US" sz="2000" b="0" i="1" smtClean="0">
                         <a:solidFill>
                           <a:schemeClr val="tx1"/>
                         </a:solidFill>
@@ -21404,7 +22412,7 @@
                       <m:t>π</m:t>
                     </m:r>
                     <m:r>
-                      <a:rPr lang="en-US" b="0" i="1" smtClean="0">
+                      <a:rPr lang="en-US" sz="2000" b="0" i="1" smtClean="0">
                         <a:solidFill>
                           <a:schemeClr val="tx1"/>
                         </a:solidFill>
@@ -21417,7 +22425,7 @@
                       <m:rPr>
                         <m:sty m:val="p"/>
                       </m:rPr>
-                      <a:rPr lang="en-US" b="0" i="1" smtClean="0">
+                      <a:rPr lang="en-US" sz="2000" b="0" i="1" smtClean="0">
                         <a:solidFill>
                           <a:schemeClr val="tx1"/>
                         </a:solidFill>
@@ -21429,7 +22437,7 @@
                   </m:oMath>
                 </a14:m>
                 <a:r>
-                  <a:rPr lang="en-US" b="0" dirty="0">
+                  <a:rPr lang="en-US" sz="2000" b="0" dirty="0">
                     <a:solidFill>
                       <a:schemeClr val="tx1"/>
                     </a:solidFill>
@@ -21444,7 +22452,7 @@
                       <m:rPr>
                         <m:sty m:val="p"/>
                       </m:rPr>
-                      <a:rPr lang="en-US" b="0" i="1" smtClean="0">
+                      <a:rPr lang="en-US" sz="2000" b="0" i="1" smtClean="0">
                         <a:solidFill>
                           <a:schemeClr val="tx1"/>
                         </a:solidFill>
@@ -21454,7 +22462,7 @@
                       <m:t>ω</m:t>
                     </m:r>
                     <m:r>
-                      <a:rPr lang="en-US" b="0" i="1" smtClean="0">
+                      <a:rPr lang="en-US" sz="2000" b="0" i="1" smtClean="0">
                         <a:solidFill>
                           <a:schemeClr val="tx1"/>
                         </a:solidFill>
@@ -21467,7 +22475,7 @@
                       <m:rPr>
                         <m:sty m:val="p"/>
                       </m:rPr>
-                      <a:rPr lang="en-US" b="0" i="1" smtClean="0">
+                      <a:rPr lang="en-US" sz="2000" b="0" i="1" smtClean="0">
                         <a:solidFill>
                           <a:schemeClr val="tx1"/>
                         </a:solidFill>
@@ -21479,7 +22487,7 @@
                   </m:oMath>
                 </a14:m>
                 <a:r>
-                  <a:rPr lang="en-US" b="0" dirty="0">
+                  <a:rPr lang="en-US" sz="2000" b="0" dirty="0">
                     <a:solidFill>
                       <a:schemeClr val="tx1"/>
                     </a:solidFill>
@@ -21507,7 +22515,7 @@
             </p:txBody>
           </p:sp>
         </mc:Choice>
-        <mc:Fallback xmlns="">
+        <mc:Fallback>
           <p:sp>
             <p:nvSpPr>
               <p:cNvPr id="3" name="Content Placeholder 2">
@@ -21532,7 +22540,7 @@
               <a:blipFill>
                 <a:blip r:embed="rId2"/>
                 <a:stretch>
-                  <a:fillRect l="-244"/>
+                  <a:fillRect l="-488" t="-885"/>
                 </a:stretch>
               </a:blipFill>
             </p:spPr>
@@ -22192,7 +23200,7 @@
 </p:sld>
 </file>
 
-<file path=ppt/slides/slide5.xml><?xml version="1.0" encoding="utf-8"?>
+<file path=ppt/slides/slide6.xml><?xml version="1.0" encoding="utf-8"?>
 <p:sld xmlns:a="http://schemas.openxmlformats.org/drawingml/2006/main" xmlns:r="http://schemas.openxmlformats.org/officeDocument/2006/relationships" xmlns:p="http://schemas.openxmlformats.org/presentationml/2006/main">
   <p:cSld>
     <p:bg>
@@ -22217,36 +23225,6 @@
           <a:chExt cx="0" cy="0"/>
         </a:xfrm>
       </p:grpSpPr>
-      <p:pic>
-        <p:nvPicPr>
-          <p:cNvPr id="3" name="Picture 2" descr="A graph of an audio wave&#10;&#10;AI-generated content may be incorrect.">
-            <a:extLst>
-              <a:ext uri="{FF2B5EF4-FFF2-40B4-BE49-F238E27FC236}">
-                <a16:creationId xmlns:a16="http://schemas.microsoft.com/office/drawing/2014/main" id="{B7E216DD-4435-7B98-826B-7552932AC274}"/>
-              </a:ext>
-            </a:extLst>
-          </p:cNvPr>
-          <p:cNvPicPr>
-            <a:picLocks noChangeAspect="1"/>
-          </p:cNvPicPr>
-          <p:nvPr/>
-        </p:nvPicPr>
-        <p:blipFill>
-          <a:blip r:embed="rId2"/>
-          <a:stretch>
-            <a:fillRect/>
-          </a:stretch>
-        </p:blipFill>
-        <p:spPr>
-          <a:xfrm>
-            <a:off x="638932" y="3556645"/>
-            <a:ext cx="4848616" cy="3187965"/>
-          </a:xfrm>
-          <a:prstGeom prst="rect">
-            <a:avLst/>
-          </a:prstGeom>
-        </p:spPr>
-      </p:pic>
       <p:sp>
         <p:nvSpPr>
           <p:cNvPr id="19" name="Rectangle 18">
@@ -22313,36 +23291,6 @@
           </a:p>
         </p:txBody>
       </p:sp>
-      <p:pic>
-        <p:nvPicPr>
-          <p:cNvPr id="5" name="Picture 4" descr="A graph of a graph of a graph&#10;&#10;AI-generated content may be incorrect.">
-            <a:extLst>
-              <a:ext uri="{FF2B5EF4-FFF2-40B4-BE49-F238E27FC236}">
-                <a16:creationId xmlns:a16="http://schemas.microsoft.com/office/drawing/2014/main" id="{9C8D3233-98E4-F537-B701-3D0690E3DC50}"/>
-              </a:ext>
-            </a:extLst>
-          </p:cNvPr>
-          <p:cNvPicPr>
-            <a:picLocks noChangeAspect="1"/>
-          </p:cNvPicPr>
-          <p:nvPr/>
-        </p:nvPicPr>
-        <p:blipFill>
-          <a:blip r:embed="rId3"/>
-          <a:stretch>
-            <a:fillRect/>
-          </a:stretch>
-        </p:blipFill>
-        <p:spPr>
-          <a:xfrm>
-            <a:off x="6720294" y="115729"/>
-            <a:ext cx="4592140" cy="3111175"/>
-          </a:xfrm>
-          <a:prstGeom prst="rect">
-            <a:avLst/>
-          </a:prstGeom>
-        </p:spPr>
-      </p:pic>
       <p:sp>
         <p:nvSpPr>
           <p:cNvPr id="25" name="Rectangle 24">
@@ -22477,10 +23425,40 @@
       </p:sp>
       <p:pic>
         <p:nvPicPr>
-          <p:cNvPr id="11" name="Picture 10" descr="A graph of a sprinkler data&#10;&#10;AI-generated content may be incorrect.">
+          <p:cNvPr id="4" name="Picture 3" descr="A graph of a sprinkler data&#10;&#10;AI-generated content may be incorrect.">
             <a:extLst>
               <a:ext uri="{FF2B5EF4-FFF2-40B4-BE49-F238E27FC236}">
-                <a16:creationId xmlns:a16="http://schemas.microsoft.com/office/drawing/2014/main" id="{D56B8D3A-0E77-4611-319A-30971D04A52E}"/>
+                <a16:creationId xmlns:a16="http://schemas.microsoft.com/office/drawing/2014/main" id="{1AE5B7DE-66DC-248F-152B-E74C51A59D5C}"/>
+              </a:ext>
+            </a:extLst>
+          </p:cNvPr>
+          <p:cNvPicPr>
+            <a:picLocks noChangeAspect="1"/>
+          </p:cNvPicPr>
+          <p:nvPr/>
+        </p:nvPicPr>
+        <p:blipFill>
+          <a:blip r:embed="rId3"/>
+          <a:stretch>
+            <a:fillRect/>
+          </a:stretch>
+        </p:blipFill>
+        <p:spPr>
+          <a:xfrm>
+            <a:off x="102023" y="3506254"/>
+            <a:ext cx="5578949" cy="3322885"/>
+          </a:xfrm>
+          <a:prstGeom prst="rect">
+            <a:avLst/>
+          </a:prstGeom>
+        </p:spPr>
+      </p:pic>
+      <p:pic>
+        <p:nvPicPr>
+          <p:cNvPr id="7" name="Picture 6" descr="A graph of a sprinkler data&#10;&#10;AI-generated content may be incorrect.">
+            <a:extLst>
+              <a:ext uri="{FF2B5EF4-FFF2-40B4-BE49-F238E27FC236}">
+                <a16:creationId xmlns:a16="http://schemas.microsoft.com/office/drawing/2014/main" id="{CB1A0BE2-1815-28FF-9747-9D134EF0A0B2}"/>
               </a:ext>
             </a:extLst>
           </p:cNvPr>
@@ -22497,8 +23475,8 @@
         </p:blipFill>
         <p:spPr>
           <a:xfrm>
-            <a:off x="6616321" y="3556645"/>
-            <a:ext cx="4696113" cy="3111175"/>
+            <a:off x="6398772" y="3519536"/>
+            <a:ext cx="5459976" cy="3309603"/>
           </a:xfrm>
           <a:prstGeom prst="rect">
             <a:avLst/>
@@ -22507,10 +23485,10 @@
       </p:pic>
       <p:pic>
         <p:nvPicPr>
-          <p:cNvPr id="16" name="Picture 15" descr="A blue line graph with white text&#10;&#10;AI-generated content may be incorrect.">
+          <p:cNvPr id="9" name="Picture 8" descr="A graph of a function&#10;&#10;AI-generated content may be incorrect.">
             <a:extLst>
               <a:ext uri="{FF2B5EF4-FFF2-40B4-BE49-F238E27FC236}">
-                <a16:creationId xmlns:a16="http://schemas.microsoft.com/office/drawing/2014/main" id="{239C7EDC-246B-114C-323D-A54A7E8AB67E}"/>
+                <a16:creationId xmlns:a16="http://schemas.microsoft.com/office/drawing/2014/main" id="{45723C84-D1BF-3B4A-60D0-7C31A6C43726}"/>
               </a:ext>
             </a:extLst>
           </p:cNvPr>
@@ -22527,8 +23505,38 @@
         </p:blipFill>
         <p:spPr>
           <a:xfrm>
-            <a:off x="600120" y="179179"/>
-            <a:ext cx="4926240" cy="3128164"/>
+            <a:off x="89002" y="28861"/>
+            <a:ext cx="5756479" cy="3326366"/>
+          </a:xfrm>
+          <a:prstGeom prst="rect">
+            <a:avLst/>
+          </a:prstGeom>
+        </p:spPr>
+      </p:pic>
+      <p:pic>
+        <p:nvPicPr>
+          <p:cNvPr id="12" name="Picture 11" descr="A graph of a graph&#10;&#10;AI-generated content may be incorrect.">
+            <a:extLst>
+              <a:ext uri="{FF2B5EF4-FFF2-40B4-BE49-F238E27FC236}">
+                <a16:creationId xmlns:a16="http://schemas.microsoft.com/office/drawing/2014/main" id="{431B9109-51DB-1921-5EB2-9266899D75D4}"/>
+              </a:ext>
+            </a:extLst>
+          </p:cNvPr>
+          <p:cNvPicPr>
+            <a:picLocks noChangeAspect="1"/>
+          </p:cNvPicPr>
+          <p:nvPr/>
+        </p:nvPicPr>
+        <p:blipFill>
+          <a:blip r:embed="rId6"/>
+          <a:stretch>
+            <a:fillRect/>
+          </a:stretch>
+        </p:blipFill>
+        <p:spPr>
+          <a:xfrm>
+            <a:off x="6259613" y="0"/>
+            <a:ext cx="5711391" cy="3384089"/>
           </a:xfrm>
           <a:prstGeom prst="rect">
             <a:avLst/>
@@ -22611,7 +23619,7 @@
 </p:sld>
 </file>
 
-<file path=ppt/slides/slide6.xml><?xml version="1.0" encoding="utf-8"?>
+<file path=ppt/slides/slide7.xml><?xml version="1.0" encoding="utf-8"?>
 <p:sld xmlns:a="http://schemas.openxmlformats.org/drawingml/2006/main" xmlns:r="http://schemas.openxmlformats.org/officeDocument/2006/relationships" xmlns:p="http://schemas.openxmlformats.org/presentationml/2006/main">
   <p:cSld>
     <p:bg>
@@ -22642,36 +23650,6 @@
           <a:chExt cx="0" cy="0"/>
         </a:xfrm>
       </p:grpSpPr>
-      <p:pic>
-        <p:nvPicPr>
-          <p:cNvPr id="8" name="Picture 7" descr="A blue line with red x and black text&#10;&#10;AI-generated content may be incorrect.">
-            <a:extLst>
-              <a:ext uri="{FF2B5EF4-FFF2-40B4-BE49-F238E27FC236}">
-                <a16:creationId xmlns:a16="http://schemas.microsoft.com/office/drawing/2014/main" id="{B445E77E-E540-FDCE-B147-15A480936899}"/>
-              </a:ext>
-            </a:extLst>
-          </p:cNvPr>
-          <p:cNvPicPr>
-            <a:picLocks noChangeAspect="1"/>
-          </p:cNvPicPr>
-          <p:nvPr/>
-        </p:nvPicPr>
-        <p:blipFill>
-          <a:blip r:embed="rId2"/>
-          <a:stretch>
-            <a:fillRect/>
-          </a:stretch>
-        </p:blipFill>
-        <p:spPr>
-          <a:xfrm>
-            <a:off x="548640" y="109384"/>
-            <a:ext cx="4909479" cy="3117520"/>
-          </a:xfrm>
-          <a:prstGeom prst="rect">
-            <a:avLst/>
-          </a:prstGeom>
-        </p:spPr>
-      </p:pic>
       <p:sp>
         <p:nvSpPr>
           <p:cNvPr id="19" name="Rectangle 18">
@@ -22738,36 +23716,6 @@
           </a:p>
         </p:txBody>
       </p:sp>
-      <p:pic>
-        <p:nvPicPr>
-          <p:cNvPr id="14" name="Picture 13" descr="A graph of a graph&#10;&#10;AI-generated content may be incorrect.">
-            <a:extLst>
-              <a:ext uri="{FF2B5EF4-FFF2-40B4-BE49-F238E27FC236}">
-                <a16:creationId xmlns:a16="http://schemas.microsoft.com/office/drawing/2014/main" id="{8A7108E8-375B-BA83-E240-8820E536DD6A}"/>
-              </a:ext>
-            </a:extLst>
-          </p:cNvPr>
-          <p:cNvPicPr>
-            <a:picLocks noChangeAspect="1"/>
-          </p:cNvPicPr>
-          <p:nvPr/>
-        </p:nvPicPr>
-        <p:blipFill>
-          <a:blip r:embed="rId3"/>
-          <a:stretch>
-            <a:fillRect/>
-          </a:stretch>
-        </p:blipFill>
-        <p:spPr>
-          <a:xfrm>
-            <a:off x="6508681" y="193321"/>
-            <a:ext cx="4760209" cy="3129837"/>
-          </a:xfrm>
-          <a:prstGeom prst="rect">
-            <a:avLst/>
-          </a:prstGeom>
-        </p:spPr>
-      </p:pic>
       <p:sp>
         <p:nvSpPr>
           <p:cNvPr id="21" name="Rectangle 20">
@@ -22902,10 +23850,70 @@
       </p:sp>
       <p:pic>
         <p:nvPicPr>
-          <p:cNvPr id="10" name="Picture 9" descr="A graph of a function&#10;&#10;AI-generated content may be incorrect.">
+          <p:cNvPr id="3" name="Picture 2" descr="A graph of a function&#10;&#10;AI-generated content may be incorrect.">
             <a:extLst>
               <a:ext uri="{FF2B5EF4-FFF2-40B4-BE49-F238E27FC236}">
-                <a16:creationId xmlns:a16="http://schemas.microsoft.com/office/drawing/2014/main" id="{78DF612E-D55A-77C8-2C03-82F050E4D00E}"/>
+                <a16:creationId xmlns:a16="http://schemas.microsoft.com/office/drawing/2014/main" id="{EF9A1931-D854-900E-06DB-7FC9BCCBCAB6}"/>
+              </a:ext>
+            </a:extLst>
+          </p:cNvPr>
+          <p:cNvPicPr>
+            <a:picLocks noChangeAspect="1"/>
+          </p:cNvPicPr>
+          <p:nvPr/>
+        </p:nvPicPr>
+        <p:blipFill>
+          <a:blip r:embed="rId2"/>
+          <a:stretch>
+            <a:fillRect/>
+          </a:stretch>
+        </p:blipFill>
+        <p:spPr>
+          <a:xfrm>
+            <a:off x="102546" y="98844"/>
+            <a:ext cx="5496128" cy="3175923"/>
+          </a:xfrm>
+          <a:prstGeom prst="rect">
+            <a:avLst/>
+          </a:prstGeom>
+        </p:spPr>
+      </p:pic>
+      <p:pic>
+        <p:nvPicPr>
+          <p:cNvPr id="6" name="Picture 5" descr="A graph with purple lines&#10;&#10;AI-generated content may be incorrect.">
+            <a:extLst>
+              <a:ext uri="{FF2B5EF4-FFF2-40B4-BE49-F238E27FC236}">
+                <a16:creationId xmlns:a16="http://schemas.microsoft.com/office/drawing/2014/main" id="{A31FDD22-D3BC-5C78-5503-B233987029EB}"/>
+              </a:ext>
+            </a:extLst>
+          </p:cNvPr>
+          <p:cNvPicPr>
+            <a:picLocks noChangeAspect="1"/>
+          </p:cNvPicPr>
+          <p:nvPr/>
+        </p:nvPicPr>
+        <p:blipFill>
+          <a:blip r:embed="rId3"/>
+          <a:stretch>
+            <a:fillRect/>
+          </a:stretch>
+        </p:blipFill>
+        <p:spPr>
+          <a:xfrm>
+            <a:off x="6156960" y="18857"/>
+            <a:ext cx="5755364" cy="3410143"/>
+          </a:xfrm>
+          <a:prstGeom prst="rect">
+            <a:avLst/>
+          </a:prstGeom>
+        </p:spPr>
+      </p:pic>
+      <p:pic>
+        <p:nvPicPr>
+          <p:cNvPr id="9" name="Picture 8" descr="A graph of a sprinkler data&#10;&#10;AI-generated content may be incorrect.">
+            <a:extLst>
+              <a:ext uri="{FF2B5EF4-FFF2-40B4-BE49-F238E27FC236}">
+                <a16:creationId xmlns:a16="http://schemas.microsoft.com/office/drawing/2014/main" id="{43286DC8-2A62-3EA0-EF85-FDE8770AA1CE}"/>
               </a:ext>
             </a:extLst>
           </p:cNvPr>
@@ -22922,8 +23930,8 @@
         </p:blipFill>
         <p:spPr>
           <a:xfrm>
-            <a:off x="357051" y="3631096"/>
-            <a:ext cx="5104452" cy="3075434"/>
+            <a:off x="279675" y="3583233"/>
+            <a:ext cx="5318999" cy="3218502"/>
           </a:xfrm>
           <a:prstGeom prst="rect">
             <a:avLst/>
@@ -22932,10 +23940,10 @@
       </p:pic>
       <p:pic>
         <p:nvPicPr>
-          <p:cNvPr id="4" name="Picture 3" descr="A graph of a graph&#10;&#10;AI-generated content may be incorrect.">
+          <p:cNvPr id="12" name="Picture 11" descr="A graph of a sprinkler data&#10;&#10;AI-generated content may be incorrect.">
             <a:extLst>
               <a:ext uri="{FF2B5EF4-FFF2-40B4-BE49-F238E27FC236}">
-                <a16:creationId xmlns:a16="http://schemas.microsoft.com/office/drawing/2014/main" id="{A352D981-695F-39C8-15F5-3EFEFAE42017}"/>
+                <a16:creationId xmlns:a16="http://schemas.microsoft.com/office/drawing/2014/main" id="{1D46CC79-08A8-B347-8580-6FB4B5A33164}"/>
               </a:ext>
             </a:extLst>
           </p:cNvPr>
@@ -22952,38 +23960,8 @@
         </p:blipFill>
         <p:spPr>
           <a:xfrm>
-            <a:off x="6323444" y="3631096"/>
-            <a:ext cx="4945446" cy="3226904"/>
-          </a:xfrm>
-          <a:prstGeom prst="rect">
-            <a:avLst/>
-          </a:prstGeom>
-        </p:spPr>
-      </p:pic>
-      <p:pic>
-        <p:nvPicPr>
-          <p:cNvPr id="16" name="Picture 15">
-            <a:extLst>
-              <a:ext uri="{FF2B5EF4-FFF2-40B4-BE49-F238E27FC236}">
-                <a16:creationId xmlns:a16="http://schemas.microsoft.com/office/drawing/2014/main" id="{2A6A5483-9C93-3CFA-E755-641697BD2881}"/>
-              </a:ext>
-            </a:extLst>
-          </p:cNvPr>
-          <p:cNvPicPr>
-            <a:picLocks noChangeAspect="1"/>
-          </p:cNvPicPr>
-          <p:nvPr/>
-        </p:nvPicPr>
-        <p:blipFill>
-          <a:blip r:embed="rId6"/>
-          <a:stretch>
-            <a:fillRect/>
-          </a:stretch>
-        </p:blipFill>
-        <p:spPr>
-          <a:xfrm>
-            <a:off x="7445828" y="3500467"/>
-            <a:ext cx="3210855" cy="208272"/>
+            <a:off x="6156960" y="3532317"/>
+            <a:ext cx="5496128" cy="3325683"/>
           </a:xfrm>
           <a:prstGeom prst="rect">
             <a:avLst/>
@@ -23053,36 +24031,6 @@
           </a:p>
         </p:txBody>
       </p:sp>
-      <p:pic>
-        <p:nvPicPr>
-          <p:cNvPr id="18" name="Picture 17">
-            <a:extLst>
-              <a:ext uri="{FF2B5EF4-FFF2-40B4-BE49-F238E27FC236}">
-                <a16:creationId xmlns:a16="http://schemas.microsoft.com/office/drawing/2014/main" id="{F2AD79DA-6E20-76BC-7067-9D100420782C}"/>
-              </a:ext>
-            </a:extLst>
-          </p:cNvPr>
-          <p:cNvPicPr>
-            <a:picLocks noChangeAspect="1"/>
-          </p:cNvPicPr>
-          <p:nvPr/>
-        </p:nvPicPr>
-        <p:blipFill>
-          <a:blip r:embed="rId7"/>
-          <a:stretch>
-            <a:fillRect/>
-          </a:stretch>
-        </p:blipFill>
-        <p:spPr>
-          <a:xfrm>
-            <a:off x="2079747" y="3480873"/>
-            <a:ext cx="1925574" cy="187861"/>
-          </a:xfrm>
-          <a:prstGeom prst="rect">
-            <a:avLst/>
-          </a:prstGeom>
-        </p:spPr>
-      </p:pic>
     </p:spTree>
     <p:extLst>
       <p:ext uri="{BB962C8B-B14F-4D97-AF65-F5344CB8AC3E}">
@@ -23096,7 +24044,7 @@
 </p:sld>
 </file>
 
-<file path=ppt/slides/slide7.xml><?xml version="1.0" encoding="utf-8"?>
+<file path=ppt/slides/slide8.xml><?xml version="1.0" encoding="utf-8"?>
 <p:sld xmlns:a="http://schemas.openxmlformats.org/drawingml/2006/main" xmlns:r="http://schemas.openxmlformats.org/officeDocument/2006/relationships" xmlns:p="http://schemas.openxmlformats.org/presentationml/2006/main">
   <p:cSld>
     <p:spTree>

</xml_diff>